<commit_message>
no psd export on Export curves
</commit_message>
<xml_diff>
--- a/manual/Pictures 2.0/Pictures 2.0.pptx
+++ b/manual/Pictures 2.0/Pictures 2.0.pptx
@@ -6,14 +6,15 @@
   </p:sldMasterIdLst>
   <p:sldIdLst>
     <p:sldId id="262" r:id="rId2"/>
-    <p:sldId id="263" r:id="rId3"/>
-    <p:sldId id="264" r:id="rId4"/>
-    <p:sldId id="265" r:id="rId5"/>
-    <p:sldId id="266" r:id="rId6"/>
-    <p:sldId id="267" r:id="rId7"/>
-    <p:sldId id="268" r:id="rId8"/>
-    <p:sldId id="269" r:id="rId9"/>
-    <p:sldId id="270" r:id="rId10"/>
+    <p:sldId id="271" r:id="rId3"/>
+    <p:sldId id="263" r:id="rId4"/>
+    <p:sldId id="264" r:id="rId5"/>
+    <p:sldId id="265" r:id="rId6"/>
+    <p:sldId id="266" r:id="rId7"/>
+    <p:sldId id="267" r:id="rId8"/>
+    <p:sldId id="268" r:id="rId9"/>
+    <p:sldId id="269" r:id="rId10"/>
+    <p:sldId id="270" r:id="rId11"/>
   </p:sldIdLst>
   <p:sldSz cx="9144000" cy="6858000" type="screen4x3"/>
   <p:notesSz cx="6858000" cy="9144000"/>
@@ -4161,7 +4162,611 @@
 </p:sld>
 </file>
 
+<file path=ppt/slides/slide10.xml><?xml version="1.0" encoding="utf-8"?>
+<p:sld xmlns:a="http://schemas.openxmlformats.org/drawingml/2006/main" xmlns:r="http://schemas.openxmlformats.org/officeDocument/2006/relationships" xmlns:p="http://schemas.openxmlformats.org/presentationml/2006/main">
+  <p:cSld>
+    <p:spTree>
+      <p:nvGrpSpPr>
+        <p:cNvPr id="1" name=""/>
+        <p:cNvGrpSpPr/>
+        <p:nvPr/>
+      </p:nvGrpSpPr>
+      <p:grpSpPr>
+        <a:xfrm>
+          <a:off x="0" y="0"/>
+          <a:ext cx="0" cy="0"/>
+          <a:chOff x="0" y="0"/>
+          <a:chExt cx="0" cy="0"/>
+        </a:xfrm>
+      </p:grpSpPr>
+    </p:spTree>
+    <p:extLst>
+      <p:ext uri="{BB962C8B-B14F-4D97-AF65-F5344CB8AC3E}">
+        <p14:creationId xmlns:p14="http://schemas.microsoft.com/office/powerpoint/2010/main" val="1001471130"/>
+      </p:ext>
+    </p:extLst>
+  </p:cSld>
+  <p:clrMapOvr>
+    <a:masterClrMapping/>
+  </p:clrMapOvr>
+</p:sld>
+</file>
+
 <file path=ppt/slides/slide2.xml><?xml version="1.0" encoding="utf-8"?>
+<p:sld xmlns:a="http://schemas.openxmlformats.org/drawingml/2006/main" xmlns:r="http://schemas.openxmlformats.org/officeDocument/2006/relationships" xmlns:p="http://schemas.openxmlformats.org/presentationml/2006/main">
+  <p:cSld>
+    <p:spTree>
+      <p:nvGrpSpPr>
+        <p:cNvPr id="1" name=""/>
+        <p:cNvGrpSpPr/>
+        <p:nvPr/>
+      </p:nvGrpSpPr>
+      <p:grpSpPr>
+        <a:xfrm>
+          <a:off x="0" y="0"/>
+          <a:ext cx="0" cy="0"/>
+          <a:chOff x="0" y="0"/>
+          <a:chExt cx="0" cy="0"/>
+        </a:xfrm>
+      </p:grpSpPr>
+      <p:grpSp>
+        <p:nvGrpSpPr>
+          <p:cNvPr id="23" name="Group 22">
+            <a:extLst>
+              <a:ext uri="{FF2B5EF4-FFF2-40B4-BE49-F238E27FC236}">
+                <a16:creationId xmlns:a16="http://schemas.microsoft.com/office/drawing/2014/main" id="{1CDB5274-F06F-AF7D-493D-C843DE39B82B}"/>
+              </a:ext>
+            </a:extLst>
+          </p:cNvPr>
+          <p:cNvGrpSpPr/>
+          <p:nvPr/>
+        </p:nvGrpSpPr>
+        <p:grpSpPr>
+          <a:xfrm>
+            <a:off x="740567" y="328613"/>
+            <a:ext cx="2333625" cy="2009775"/>
+            <a:chOff x="261938" y="309563"/>
+            <a:chExt cx="2333625" cy="2009775"/>
+          </a:xfrm>
+        </p:grpSpPr>
+        <p:graphicFrame>
+          <p:nvGraphicFramePr>
+            <p:cNvPr id="11" name="Object 10">
+              <a:extLst>
+                <a:ext uri="{FF2B5EF4-FFF2-40B4-BE49-F238E27FC236}">
+                  <a16:creationId xmlns:a16="http://schemas.microsoft.com/office/drawing/2014/main" id="{61734494-B75B-40C1-0CCE-A89B8EA29435}"/>
+                </a:ext>
+              </a:extLst>
+            </p:cNvPr>
+            <p:cNvGraphicFramePr>
+              <a:graphicFrameLocks noChangeAspect="1"/>
+            </p:cNvGraphicFramePr>
+            <p:nvPr>
+              <p:extLst>
+                <p:ext uri="{D42A27DB-BD31-4B8C-83A1-F6EECF244321}">
+                  <p14:modId xmlns:p14="http://schemas.microsoft.com/office/powerpoint/2010/main" val="795417189"/>
+                </p:ext>
+              </p:extLst>
+            </p:nvPr>
+          </p:nvGraphicFramePr>
+          <p:xfrm>
+            <a:off x="280988" y="328613"/>
+            <a:ext cx="2314575" cy="1990725"/>
+          </p:xfrm>
+          <a:graphic>
+            <a:graphicData uri="http://schemas.openxmlformats.org/presentationml/2006/ole">
+              <mc:AlternateContent xmlns:mc="http://schemas.openxmlformats.org/markup-compatibility/2006">
+                <mc:Choice xmlns:v="urn:schemas-microsoft-com:vml" Requires="v">
+                  <p:oleObj name="Bitmap Image" r:id="rId2" imgW="2314440" imgH="1990800" progId="PBrush">
+                    <p:embed/>
+                  </p:oleObj>
+                </mc:Choice>
+                <mc:Fallback>
+                  <p:oleObj name="Bitmap Image" r:id="rId2" imgW="2314440" imgH="1990800" progId="PBrush">
+                    <p:embed/>
+                    <p:pic>
+                      <p:nvPicPr>
+                        <p:cNvPr id="0" name=""/>
+                        <p:cNvPicPr/>
+                        <p:nvPr/>
+                      </p:nvPicPr>
+                      <p:blipFill>
+                        <a:blip r:embed="rId3"/>
+                        <a:stretch>
+                          <a:fillRect/>
+                        </a:stretch>
+                      </p:blipFill>
+                      <p:spPr>
+                        <a:xfrm>
+                          <a:off x="280988" y="328613"/>
+                          <a:ext cx="2314575" cy="1990725"/>
+                        </a:xfrm>
+                        <a:prstGeom prst="rect">
+                          <a:avLst/>
+                        </a:prstGeom>
+                      </p:spPr>
+                    </p:pic>
+                  </p:oleObj>
+                </mc:Fallback>
+              </mc:AlternateContent>
+            </a:graphicData>
+          </a:graphic>
+        </p:graphicFrame>
+        <p:sp>
+          <p:nvSpPr>
+            <p:cNvPr id="12" name="Овал 5">
+              <a:extLst>
+                <a:ext uri="{FF2B5EF4-FFF2-40B4-BE49-F238E27FC236}">
+                  <a16:creationId xmlns:a16="http://schemas.microsoft.com/office/drawing/2014/main" id="{2862245D-BD5C-B83A-83E5-38D4080DF592}"/>
+                </a:ext>
+              </a:extLst>
+            </p:cNvPr>
+            <p:cNvSpPr/>
+            <p:nvPr/>
+          </p:nvSpPr>
+          <p:spPr>
+            <a:xfrm>
+              <a:off x="261938" y="309563"/>
+              <a:ext cx="361950" cy="247650"/>
+            </a:xfrm>
+            <a:prstGeom prst="ellipse">
+              <a:avLst/>
+            </a:prstGeom>
+            <a:noFill/>
+            <a:ln w="19050">
+              <a:solidFill>
+                <a:srgbClr val="FF0000"/>
+              </a:solidFill>
+            </a:ln>
+          </p:spPr>
+          <p:style>
+            <a:lnRef idx="2">
+              <a:schemeClr val="accent1">
+                <a:shade val="50000"/>
+              </a:schemeClr>
+            </a:lnRef>
+            <a:fillRef idx="1">
+              <a:schemeClr val="accent1"/>
+            </a:fillRef>
+            <a:effectRef idx="0">
+              <a:schemeClr val="accent1"/>
+            </a:effectRef>
+            <a:fontRef idx="minor">
+              <a:schemeClr val="lt1"/>
+            </a:fontRef>
+          </p:style>
+          <p:txBody>
+            <a:bodyPr rtlCol="0" anchor="ctr"/>
+            <a:lstStyle/>
+            <a:p>
+              <a:pPr algn="ctr"/>
+              <a:endParaRPr lang="ru-RU"/>
+            </a:p>
+          </p:txBody>
+        </p:sp>
+      </p:grpSp>
+      <p:grpSp>
+        <p:nvGrpSpPr>
+          <p:cNvPr id="24" name="Group 23">
+            <a:extLst>
+              <a:ext uri="{FF2B5EF4-FFF2-40B4-BE49-F238E27FC236}">
+                <a16:creationId xmlns:a16="http://schemas.microsoft.com/office/drawing/2014/main" id="{1C67D4B8-CCAC-2FAE-8DA4-565E6102D899}"/>
+              </a:ext>
+            </a:extLst>
+          </p:cNvPr>
+          <p:cNvGrpSpPr/>
+          <p:nvPr/>
+        </p:nvGrpSpPr>
+        <p:grpSpPr>
+          <a:xfrm>
+            <a:off x="4572000" y="328613"/>
+            <a:ext cx="3276600" cy="1181100"/>
+            <a:chOff x="2828925" y="309563"/>
+            <a:chExt cx="3276600" cy="1181100"/>
+          </a:xfrm>
+        </p:grpSpPr>
+        <p:graphicFrame>
+          <p:nvGraphicFramePr>
+            <p:cNvPr id="14" name="Object 13">
+              <a:extLst>
+                <a:ext uri="{FF2B5EF4-FFF2-40B4-BE49-F238E27FC236}">
+                  <a16:creationId xmlns:a16="http://schemas.microsoft.com/office/drawing/2014/main" id="{6F39115B-FD5B-4C5D-FEFC-7AFF06DE6573}"/>
+                </a:ext>
+              </a:extLst>
+            </p:cNvPr>
+            <p:cNvGraphicFramePr>
+              <a:graphicFrameLocks noChangeAspect="1"/>
+            </p:cNvGraphicFramePr>
+            <p:nvPr>
+              <p:extLst>
+                <p:ext uri="{D42A27DB-BD31-4B8C-83A1-F6EECF244321}">
+                  <p14:modId xmlns:p14="http://schemas.microsoft.com/office/powerpoint/2010/main" val="916739203"/>
+                </p:ext>
+              </p:extLst>
+            </p:nvPr>
+          </p:nvGraphicFramePr>
+          <p:xfrm>
+            <a:off x="2828925" y="328613"/>
+            <a:ext cx="3276600" cy="1162050"/>
+          </p:xfrm>
+          <a:graphic>
+            <a:graphicData uri="http://schemas.openxmlformats.org/presentationml/2006/ole">
+              <mc:AlternateContent xmlns:mc="http://schemas.openxmlformats.org/markup-compatibility/2006">
+                <mc:Choice xmlns:v="urn:schemas-microsoft-com:vml" Requires="v">
+                  <p:oleObj name="Bitmap Image" r:id="rId4" imgW="3276720" imgH="1162080" progId="PBrush">
+                    <p:embed/>
+                  </p:oleObj>
+                </mc:Choice>
+                <mc:Fallback>
+                  <p:oleObj name="Bitmap Image" r:id="rId4" imgW="3276720" imgH="1162080" progId="PBrush">
+                    <p:embed/>
+                    <p:pic>
+                      <p:nvPicPr>
+                        <p:cNvPr id="0" name=""/>
+                        <p:cNvPicPr/>
+                        <p:nvPr/>
+                      </p:nvPicPr>
+                      <p:blipFill>
+                        <a:blip r:embed="rId5"/>
+                        <a:stretch>
+                          <a:fillRect/>
+                        </a:stretch>
+                      </p:blipFill>
+                      <p:spPr>
+                        <a:xfrm>
+                          <a:off x="2828925" y="328613"/>
+                          <a:ext cx="3276600" cy="1162050"/>
+                        </a:xfrm>
+                        <a:prstGeom prst="rect">
+                          <a:avLst/>
+                        </a:prstGeom>
+                      </p:spPr>
+                    </p:pic>
+                  </p:oleObj>
+                </mc:Fallback>
+              </mc:AlternateContent>
+            </a:graphicData>
+          </a:graphic>
+        </p:graphicFrame>
+        <p:sp>
+          <p:nvSpPr>
+            <p:cNvPr id="15" name="Овал 5">
+              <a:extLst>
+                <a:ext uri="{FF2B5EF4-FFF2-40B4-BE49-F238E27FC236}">
+                  <a16:creationId xmlns:a16="http://schemas.microsoft.com/office/drawing/2014/main" id="{3AAE8653-9A08-DD31-C4D4-605A9FD79282}"/>
+                </a:ext>
+              </a:extLst>
+            </p:cNvPr>
+            <p:cNvSpPr/>
+            <p:nvPr/>
+          </p:nvSpPr>
+          <p:spPr>
+            <a:xfrm>
+              <a:off x="3167063" y="309563"/>
+              <a:ext cx="614362" cy="247650"/>
+            </a:xfrm>
+            <a:prstGeom prst="ellipse">
+              <a:avLst/>
+            </a:prstGeom>
+            <a:noFill/>
+            <a:ln w="19050">
+              <a:solidFill>
+                <a:srgbClr val="FF0000"/>
+              </a:solidFill>
+            </a:ln>
+          </p:spPr>
+          <p:style>
+            <a:lnRef idx="2">
+              <a:schemeClr val="accent1">
+                <a:shade val="50000"/>
+              </a:schemeClr>
+            </a:lnRef>
+            <a:fillRef idx="1">
+              <a:schemeClr val="accent1"/>
+            </a:fillRef>
+            <a:effectRef idx="0">
+              <a:schemeClr val="accent1"/>
+            </a:effectRef>
+            <a:fontRef idx="minor">
+              <a:schemeClr val="lt1"/>
+            </a:fontRef>
+          </p:style>
+          <p:txBody>
+            <a:bodyPr rtlCol="0" anchor="ctr"/>
+            <a:lstStyle/>
+            <a:p>
+              <a:pPr algn="ctr"/>
+              <a:endParaRPr lang="ru-RU"/>
+            </a:p>
+          </p:txBody>
+        </p:sp>
+      </p:grpSp>
+      <p:grpSp>
+        <p:nvGrpSpPr>
+          <p:cNvPr id="25" name="Group 24">
+            <a:extLst>
+              <a:ext uri="{FF2B5EF4-FFF2-40B4-BE49-F238E27FC236}">
+                <a16:creationId xmlns:a16="http://schemas.microsoft.com/office/drawing/2014/main" id="{4BA16896-B106-D0E9-6546-A3C62E8034AA}"/>
+              </a:ext>
+            </a:extLst>
+          </p:cNvPr>
+          <p:cNvGrpSpPr/>
+          <p:nvPr/>
+        </p:nvGrpSpPr>
+        <p:grpSpPr>
+          <a:xfrm>
+            <a:off x="442913" y="3119437"/>
+            <a:ext cx="2809875" cy="619125"/>
+            <a:chOff x="357188" y="2752725"/>
+            <a:chExt cx="2809875" cy="619125"/>
+          </a:xfrm>
+        </p:grpSpPr>
+        <p:graphicFrame>
+          <p:nvGraphicFramePr>
+            <p:cNvPr id="17" name="Object 16">
+              <a:extLst>
+                <a:ext uri="{FF2B5EF4-FFF2-40B4-BE49-F238E27FC236}">
+                  <a16:creationId xmlns:a16="http://schemas.microsoft.com/office/drawing/2014/main" id="{2892E8B8-8A53-557F-57CC-FE6FC71705A3}"/>
+                </a:ext>
+              </a:extLst>
+            </p:cNvPr>
+            <p:cNvGraphicFramePr>
+              <a:graphicFrameLocks noChangeAspect="1"/>
+            </p:cNvGraphicFramePr>
+            <p:nvPr>
+              <p:extLst>
+                <p:ext uri="{D42A27DB-BD31-4B8C-83A1-F6EECF244321}">
+                  <p14:modId xmlns:p14="http://schemas.microsoft.com/office/powerpoint/2010/main" val="1558659177"/>
+                </p:ext>
+              </p:extLst>
+            </p:nvPr>
+          </p:nvGraphicFramePr>
+          <p:xfrm>
+            <a:off x="357188" y="2752725"/>
+            <a:ext cx="2809875" cy="619125"/>
+          </p:xfrm>
+          <a:graphic>
+            <a:graphicData uri="http://schemas.openxmlformats.org/presentationml/2006/ole">
+              <mc:AlternateContent xmlns:mc="http://schemas.openxmlformats.org/markup-compatibility/2006">
+                <mc:Choice xmlns:v="urn:schemas-microsoft-com:vml" Requires="v">
+                  <p:oleObj name="Bitmap Image" r:id="rId6" imgW="2809800" imgH="619200" progId="PBrush">
+                    <p:embed/>
+                  </p:oleObj>
+                </mc:Choice>
+                <mc:Fallback>
+                  <p:oleObj name="Bitmap Image" r:id="rId6" imgW="2809800" imgH="619200" progId="PBrush">
+                    <p:embed/>
+                    <p:pic>
+                      <p:nvPicPr>
+                        <p:cNvPr id="0" name=""/>
+                        <p:cNvPicPr/>
+                        <p:nvPr/>
+                      </p:nvPicPr>
+                      <p:blipFill>
+                        <a:blip r:embed="rId7"/>
+                        <a:stretch>
+                          <a:fillRect/>
+                        </a:stretch>
+                      </p:blipFill>
+                      <p:spPr>
+                        <a:xfrm>
+                          <a:off x="357188" y="2752725"/>
+                          <a:ext cx="2809875" cy="619125"/>
+                        </a:xfrm>
+                        <a:prstGeom prst="rect">
+                          <a:avLst/>
+                        </a:prstGeom>
+                      </p:spPr>
+                    </p:pic>
+                  </p:oleObj>
+                </mc:Fallback>
+              </mc:AlternateContent>
+            </a:graphicData>
+          </a:graphic>
+        </p:graphicFrame>
+        <p:sp>
+          <p:nvSpPr>
+            <p:cNvPr id="18" name="Овал 5">
+              <a:extLst>
+                <a:ext uri="{FF2B5EF4-FFF2-40B4-BE49-F238E27FC236}">
+                  <a16:creationId xmlns:a16="http://schemas.microsoft.com/office/drawing/2014/main" id="{36650704-0D18-8454-193E-7E58D2F1C8BD}"/>
+                </a:ext>
+              </a:extLst>
+            </p:cNvPr>
+            <p:cNvSpPr/>
+            <p:nvPr/>
+          </p:nvSpPr>
+          <p:spPr>
+            <a:xfrm>
+              <a:off x="1309687" y="2767013"/>
+              <a:ext cx="1023937" cy="247650"/>
+            </a:xfrm>
+            <a:prstGeom prst="ellipse">
+              <a:avLst/>
+            </a:prstGeom>
+            <a:noFill/>
+            <a:ln w="19050">
+              <a:solidFill>
+                <a:srgbClr val="FF0000"/>
+              </a:solidFill>
+            </a:ln>
+          </p:spPr>
+          <p:style>
+            <a:lnRef idx="2">
+              <a:schemeClr val="accent1">
+                <a:shade val="50000"/>
+              </a:schemeClr>
+            </a:lnRef>
+            <a:fillRef idx="1">
+              <a:schemeClr val="accent1"/>
+            </a:fillRef>
+            <a:effectRef idx="0">
+              <a:schemeClr val="accent1"/>
+            </a:effectRef>
+            <a:fontRef idx="minor">
+              <a:schemeClr val="lt1"/>
+            </a:fontRef>
+          </p:style>
+          <p:txBody>
+            <a:bodyPr rtlCol="0" anchor="ctr"/>
+            <a:lstStyle/>
+            <a:p>
+              <a:pPr algn="ctr"/>
+              <a:endParaRPr lang="ru-RU"/>
+            </a:p>
+          </p:txBody>
+        </p:sp>
+      </p:grpSp>
+      <p:grpSp>
+        <p:nvGrpSpPr>
+          <p:cNvPr id="26" name="Group 25">
+            <a:extLst>
+              <a:ext uri="{FF2B5EF4-FFF2-40B4-BE49-F238E27FC236}">
+                <a16:creationId xmlns:a16="http://schemas.microsoft.com/office/drawing/2014/main" id="{77B9BBAF-1E6B-A09A-C8E5-E135AF7D8772}"/>
+              </a:ext>
+            </a:extLst>
+          </p:cNvPr>
+          <p:cNvGrpSpPr/>
+          <p:nvPr/>
+        </p:nvGrpSpPr>
+        <p:grpSpPr>
+          <a:xfrm>
+            <a:off x="4572000" y="2543175"/>
+            <a:ext cx="3848100" cy="1309688"/>
+            <a:chOff x="4572000" y="2543175"/>
+            <a:chExt cx="3848100" cy="1309688"/>
+          </a:xfrm>
+        </p:grpSpPr>
+        <p:graphicFrame>
+          <p:nvGraphicFramePr>
+            <p:cNvPr id="21" name="Object 20">
+              <a:extLst>
+                <a:ext uri="{FF2B5EF4-FFF2-40B4-BE49-F238E27FC236}">
+                  <a16:creationId xmlns:a16="http://schemas.microsoft.com/office/drawing/2014/main" id="{2E2C0B60-319F-B687-5A1F-B11EE131FA01}"/>
+                </a:ext>
+              </a:extLst>
+            </p:cNvPr>
+            <p:cNvGraphicFramePr>
+              <a:graphicFrameLocks noChangeAspect="1"/>
+            </p:cNvGraphicFramePr>
+            <p:nvPr>
+              <p:extLst>
+                <p:ext uri="{D42A27DB-BD31-4B8C-83A1-F6EECF244321}">
+                  <p14:modId xmlns:p14="http://schemas.microsoft.com/office/powerpoint/2010/main" val="2254878889"/>
+                </p:ext>
+              </p:extLst>
+            </p:nvPr>
+          </p:nvGraphicFramePr>
+          <p:xfrm>
+            <a:off x="4572000" y="2890838"/>
+            <a:ext cx="3848100" cy="962025"/>
+          </p:xfrm>
+          <a:graphic>
+            <a:graphicData uri="http://schemas.openxmlformats.org/presentationml/2006/ole">
+              <mc:AlternateContent xmlns:mc="http://schemas.openxmlformats.org/markup-compatibility/2006">
+                <mc:Choice xmlns:v="urn:schemas-microsoft-com:vml" Requires="v">
+                  <p:oleObj name="Bitmap Image" r:id="rId8" imgW="3848040" imgH="961920" progId="PBrush">
+                    <p:embed/>
+                  </p:oleObj>
+                </mc:Choice>
+                <mc:Fallback>
+                  <p:oleObj name="Bitmap Image" r:id="rId8" imgW="3848040" imgH="961920" progId="PBrush">
+                    <p:embed/>
+                    <p:pic>
+                      <p:nvPicPr>
+                        <p:cNvPr id="0" name=""/>
+                        <p:cNvPicPr/>
+                        <p:nvPr/>
+                      </p:nvPicPr>
+                      <p:blipFill>
+                        <a:blip r:embed="rId9"/>
+                        <a:stretch>
+                          <a:fillRect/>
+                        </a:stretch>
+                      </p:blipFill>
+                      <p:spPr>
+                        <a:xfrm>
+                          <a:off x="4572000" y="2890838"/>
+                          <a:ext cx="3848100" cy="962025"/>
+                        </a:xfrm>
+                        <a:prstGeom prst="rect">
+                          <a:avLst/>
+                        </a:prstGeom>
+                      </p:spPr>
+                    </p:pic>
+                  </p:oleObj>
+                </mc:Fallback>
+              </mc:AlternateContent>
+            </a:graphicData>
+          </a:graphic>
+        </p:graphicFrame>
+        <p:sp>
+          <p:nvSpPr>
+            <p:cNvPr id="22" name="Овал 5">
+              <a:extLst>
+                <a:ext uri="{FF2B5EF4-FFF2-40B4-BE49-F238E27FC236}">
+                  <a16:creationId xmlns:a16="http://schemas.microsoft.com/office/drawing/2014/main" id="{7A902283-8550-0984-EC15-876D6A5950C4}"/>
+                </a:ext>
+              </a:extLst>
+            </p:cNvPr>
+            <p:cNvSpPr/>
+            <p:nvPr/>
+          </p:nvSpPr>
+          <p:spPr>
+            <a:xfrm>
+              <a:off x="6053137" y="2543175"/>
+              <a:ext cx="442913" cy="247650"/>
+            </a:xfrm>
+            <a:prstGeom prst="ellipse">
+              <a:avLst/>
+            </a:prstGeom>
+            <a:noFill/>
+            <a:ln w="19050">
+              <a:solidFill>
+                <a:srgbClr val="FF0000"/>
+              </a:solidFill>
+            </a:ln>
+          </p:spPr>
+          <p:style>
+            <a:lnRef idx="2">
+              <a:schemeClr val="accent1">
+                <a:shade val="50000"/>
+              </a:schemeClr>
+            </a:lnRef>
+            <a:fillRef idx="1">
+              <a:schemeClr val="accent1"/>
+            </a:fillRef>
+            <a:effectRef idx="0">
+              <a:schemeClr val="accent1"/>
+            </a:effectRef>
+            <a:fontRef idx="minor">
+              <a:schemeClr val="lt1"/>
+            </a:fontRef>
+          </p:style>
+          <p:txBody>
+            <a:bodyPr rtlCol="0" anchor="ctr"/>
+            <a:lstStyle/>
+            <a:p>
+              <a:pPr algn="ctr"/>
+              <a:endParaRPr lang="ru-RU"/>
+            </a:p>
+          </p:txBody>
+        </p:sp>
+      </p:grpSp>
+    </p:spTree>
+    <p:extLst>
+      <p:ext uri="{BB962C8B-B14F-4D97-AF65-F5344CB8AC3E}">
+        <p14:creationId xmlns:p14="http://schemas.microsoft.com/office/powerpoint/2010/main" val="2204062636"/>
+      </p:ext>
+    </p:extLst>
+  </p:cSld>
+  <p:clrMapOvr>
+    <a:masterClrMapping/>
+  </p:clrMapOvr>
+</p:sld>
+</file>
+
+<file path=ppt/slides/slide3.xml><?xml version="1.0" encoding="utf-8"?>
 <p:sld xmlns:a="http://schemas.openxmlformats.org/drawingml/2006/main" xmlns:r="http://schemas.openxmlformats.org/officeDocument/2006/relationships" xmlns:p="http://schemas.openxmlformats.org/presentationml/2006/main">
   <p:cSld>
     <p:spTree>
@@ -7060,7 +7665,7 @@
 </p:sld>
 </file>
 
-<file path=ppt/slides/slide3.xml><?xml version="1.0" encoding="utf-8"?>
+<file path=ppt/slides/slide4.xml><?xml version="1.0" encoding="utf-8"?>
 <p:sld xmlns:a="http://schemas.openxmlformats.org/drawingml/2006/main" xmlns:r="http://schemas.openxmlformats.org/officeDocument/2006/relationships" xmlns:p="http://schemas.openxmlformats.org/presentationml/2006/main">
   <p:cSld>
     <p:spTree>
@@ -7855,7 +8460,7 @@
 </p:sld>
 </file>
 
-<file path=ppt/slides/slide4.xml><?xml version="1.0" encoding="utf-8"?>
+<file path=ppt/slides/slide5.xml><?xml version="1.0" encoding="utf-8"?>
 <p:sld xmlns:a="http://schemas.openxmlformats.org/drawingml/2006/main" xmlns:r="http://schemas.openxmlformats.org/officeDocument/2006/relationships" xmlns:p="http://schemas.openxmlformats.org/presentationml/2006/main">
   <p:cSld>
     <p:spTree>
@@ -8824,7 +9429,7 @@
 </p:sld>
 </file>
 
-<file path=ppt/slides/slide5.xml><?xml version="1.0" encoding="utf-8"?>
+<file path=ppt/slides/slide6.xml><?xml version="1.0" encoding="utf-8"?>
 <p:sld xmlns:a="http://schemas.openxmlformats.org/drawingml/2006/main" xmlns:r="http://schemas.openxmlformats.org/officeDocument/2006/relationships" xmlns:p="http://schemas.openxmlformats.org/presentationml/2006/main">
   <p:cSld>
     <p:spTree>
@@ -9398,7 +10003,7 @@
 </p:sld>
 </file>
 
-<file path=ppt/slides/slide6.xml><?xml version="1.0" encoding="utf-8"?>
+<file path=ppt/slides/slide7.xml><?xml version="1.0" encoding="utf-8"?>
 <p:sld xmlns:a="http://schemas.openxmlformats.org/drawingml/2006/main" xmlns:r="http://schemas.openxmlformats.org/officeDocument/2006/relationships" xmlns:p="http://schemas.openxmlformats.org/presentationml/2006/main">
   <p:cSld>
     <p:spTree>
@@ -11183,7 +11788,7 @@
 </p:sld>
 </file>
 
-<file path=ppt/slides/slide7.xml><?xml version="1.0" encoding="utf-8"?>
+<file path=ppt/slides/slide8.xml><?xml version="1.0" encoding="utf-8"?>
 <p:sld xmlns:a="http://schemas.openxmlformats.org/drawingml/2006/main" xmlns:r="http://schemas.openxmlformats.org/officeDocument/2006/relationships" xmlns:p="http://schemas.openxmlformats.org/presentationml/2006/main">
   <p:cSld>
     <p:spTree>
@@ -11298,7 +11903,7 @@
 </p:sld>
 </file>
 
-<file path=ppt/slides/slide8.xml><?xml version="1.0" encoding="utf-8"?>
+<file path=ppt/slides/slide9.xml><?xml version="1.0" encoding="utf-8"?>
 <p:sld xmlns:a="http://schemas.openxmlformats.org/drawingml/2006/main" xmlns:r="http://schemas.openxmlformats.org/officeDocument/2006/relationships" xmlns:p="http://schemas.openxmlformats.org/presentationml/2006/main">
   <p:cSld>
     <p:spTree>
@@ -16515,36 +17120,6 @@
 </p:sld>
 </file>
 
-<file path=ppt/slides/slide9.xml><?xml version="1.0" encoding="utf-8"?>
-<p:sld xmlns:a="http://schemas.openxmlformats.org/drawingml/2006/main" xmlns:r="http://schemas.openxmlformats.org/officeDocument/2006/relationships" xmlns:p="http://schemas.openxmlformats.org/presentationml/2006/main">
-  <p:cSld>
-    <p:spTree>
-      <p:nvGrpSpPr>
-        <p:cNvPr id="1" name=""/>
-        <p:cNvGrpSpPr/>
-        <p:nvPr/>
-      </p:nvGrpSpPr>
-      <p:grpSpPr>
-        <a:xfrm>
-          <a:off x="0" y="0"/>
-          <a:ext cx="0" cy="0"/>
-          <a:chOff x="0" y="0"/>
-          <a:chExt cx="0" cy="0"/>
-        </a:xfrm>
-      </p:grpSpPr>
-    </p:spTree>
-    <p:extLst>
-      <p:ext uri="{BB962C8B-B14F-4D97-AF65-F5344CB8AC3E}">
-        <p14:creationId xmlns:p14="http://schemas.microsoft.com/office/powerpoint/2010/main" val="1001471130"/>
-      </p:ext>
-    </p:extLst>
-  </p:cSld>
-  <p:clrMapOvr>
-    <a:masterClrMapping/>
-  </p:clrMapOvr>
-</p:sld>
-</file>
-
 <file path=ppt/theme/theme1.xml><?xml version="1.0" encoding="utf-8"?>
 <a:theme xmlns:a="http://schemas.openxmlformats.org/drawingml/2006/main" name="Тема Office">
   <a:themeElements>

</xml_diff>

<commit_message>
rm export structure from instruments panel
</commit_message>
<xml_diff>
--- a/manual/Pictures 2.0/Pictures 2.0.pptx
+++ b/manual/Pictures 2.0/Pictures 2.0.pptx
@@ -273,7 +273,7 @@
           <a:p>
             <a:fld id="{55465C39-D47E-4138-800A-7D6CA5F3257E}" type="datetimeFigureOut">
               <a:rPr lang="ru-RU" smtClean="0"/>
-              <a:t>17.10.2022</a:t>
+              <a:t>21.10.2022</a:t>
             </a:fld>
             <a:endParaRPr lang="ru-RU"/>
           </a:p>
@@ -443,7 +443,7 @@
           <a:p>
             <a:fld id="{55465C39-D47E-4138-800A-7D6CA5F3257E}" type="datetimeFigureOut">
               <a:rPr lang="ru-RU" smtClean="0"/>
-              <a:t>17.10.2022</a:t>
+              <a:t>21.10.2022</a:t>
             </a:fld>
             <a:endParaRPr lang="ru-RU"/>
           </a:p>
@@ -623,7 +623,7 @@
           <a:p>
             <a:fld id="{55465C39-D47E-4138-800A-7D6CA5F3257E}" type="datetimeFigureOut">
               <a:rPr lang="ru-RU" smtClean="0"/>
-              <a:t>17.10.2022</a:t>
+              <a:t>21.10.2022</a:t>
             </a:fld>
             <a:endParaRPr lang="ru-RU"/>
           </a:p>
@@ -793,7 +793,7 @@
           <a:p>
             <a:fld id="{55465C39-D47E-4138-800A-7D6CA5F3257E}" type="datetimeFigureOut">
               <a:rPr lang="ru-RU" smtClean="0"/>
-              <a:t>17.10.2022</a:t>
+              <a:t>21.10.2022</a:t>
             </a:fld>
             <a:endParaRPr lang="ru-RU"/>
           </a:p>
@@ -1037,7 +1037,7 @@
           <a:p>
             <a:fld id="{55465C39-D47E-4138-800A-7D6CA5F3257E}" type="datetimeFigureOut">
               <a:rPr lang="ru-RU" smtClean="0"/>
-              <a:t>17.10.2022</a:t>
+              <a:t>21.10.2022</a:t>
             </a:fld>
             <a:endParaRPr lang="ru-RU"/>
           </a:p>
@@ -1269,7 +1269,7 @@
           <a:p>
             <a:fld id="{55465C39-D47E-4138-800A-7D6CA5F3257E}" type="datetimeFigureOut">
               <a:rPr lang="ru-RU" smtClean="0"/>
-              <a:t>17.10.2022</a:t>
+              <a:t>21.10.2022</a:t>
             </a:fld>
             <a:endParaRPr lang="ru-RU"/>
           </a:p>
@@ -1636,7 +1636,7 @@
           <a:p>
             <a:fld id="{55465C39-D47E-4138-800A-7D6CA5F3257E}" type="datetimeFigureOut">
               <a:rPr lang="ru-RU" smtClean="0"/>
-              <a:t>17.10.2022</a:t>
+              <a:t>21.10.2022</a:t>
             </a:fld>
             <a:endParaRPr lang="ru-RU"/>
           </a:p>
@@ -1754,7 +1754,7 @@
           <a:p>
             <a:fld id="{55465C39-D47E-4138-800A-7D6CA5F3257E}" type="datetimeFigureOut">
               <a:rPr lang="ru-RU" smtClean="0"/>
-              <a:t>17.10.2022</a:t>
+              <a:t>21.10.2022</a:t>
             </a:fld>
             <a:endParaRPr lang="ru-RU"/>
           </a:p>
@@ -1849,7 +1849,7 @@
           <a:p>
             <a:fld id="{55465C39-D47E-4138-800A-7D6CA5F3257E}" type="datetimeFigureOut">
               <a:rPr lang="ru-RU" smtClean="0"/>
-              <a:t>17.10.2022</a:t>
+              <a:t>21.10.2022</a:t>
             </a:fld>
             <a:endParaRPr lang="ru-RU"/>
           </a:p>
@@ -2126,7 +2126,7 @@
           <a:p>
             <a:fld id="{55465C39-D47E-4138-800A-7D6CA5F3257E}" type="datetimeFigureOut">
               <a:rPr lang="ru-RU" smtClean="0"/>
-              <a:t>17.10.2022</a:t>
+              <a:t>21.10.2022</a:t>
             </a:fld>
             <a:endParaRPr lang="ru-RU"/>
           </a:p>
@@ -2383,7 +2383,7 @@
           <a:p>
             <a:fld id="{55465C39-D47E-4138-800A-7D6CA5F3257E}" type="datetimeFigureOut">
               <a:rPr lang="ru-RU" smtClean="0"/>
-              <a:t>17.10.2022</a:t>
+              <a:t>21.10.2022</a:t>
             </a:fld>
             <a:endParaRPr lang="ru-RU"/>
           </a:p>
@@ -2596,7 +2596,7 @@
           <a:p>
             <a:fld id="{55465C39-D47E-4138-800A-7D6CA5F3257E}" type="datetimeFigureOut">
               <a:rPr lang="ru-RU" smtClean="0"/>
-              <a:t>17.10.2022</a:t>
+              <a:t>21.10.2022</a:t>
             </a:fld>
             <a:endParaRPr lang="ru-RU"/>
           </a:p>
@@ -3003,21 +3003,559 @@
       </p:grpSpPr>
       <p:grpSp>
         <p:nvGrpSpPr>
-          <p:cNvPr id="3" name="Группа 2"/>
+          <p:cNvPr id="7" name="Group 6">
+            <a:extLst>
+              <a:ext uri="{FF2B5EF4-FFF2-40B4-BE49-F238E27FC236}">
+                <a16:creationId xmlns:a16="http://schemas.microsoft.com/office/drawing/2014/main" id="{727D2617-D46E-625C-837C-B9286B2DB8E3}"/>
+              </a:ext>
+            </a:extLst>
+          </p:cNvPr>
           <p:cNvGrpSpPr/>
           <p:nvPr/>
         </p:nvGrpSpPr>
         <p:grpSpPr>
           <a:xfrm>
-            <a:off x="5533577" y="571498"/>
-            <a:ext cx="4894959" cy="5857875"/>
-            <a:chOff x="1436339" y="597648"/>
-            <a:chExt cx="4894959" cy="5857875"/>
+            <a:off x="24813" y="575164"/>
+            <a:ext cx="4886423" cy="5848350"/>
+            <a:chOff x="24813" y="575164"/>
+            <a:chExt cx="4886423" cy="5848350"/>
           </a:xfrm>
         </p:grpSpPr>
+        <p:sp>
+          <p:nvSpPr>
+            <p:cNvPr id="26" name="Левая фигурная скобка 25"/>
+            <p:cNvSpPr/>
+            <p:nvPr/>
+          </p:nvSpPr>
+          <p:spPr>
+            <a:xfrm>
+              <a:off x="1619880" y="1422691"/>
+              <a:ext cx="276225" cy="1122910"/>
+            </a:xfrm>
+            <a:prstGeom prst="leftBrace">
+              <a:avLst>
+                <a:gd name="adj1" fmla="val 35919"/>
+                <a:gd name="adj2" fmla="val 50629"/>
+              </a:avLst>
+            </a:prstGeom>
+            <a:ln w="28575">
+              <a:solidFill>
+                <a:srgbClr val="0070C0"/>
+              </a:solidFill>
+            </a:ln>
+          </p:spPr>
+          <p:style>
+            <a:lnRef idx="1">
+              <a:schemeClr val="accent1"/>
+            </a:lnRef>
+            <a:fillRef idx="0">
+              <a:schemeClr val="accent1"/>
+            </a:fillRef>
+            <a:effectRef idx="0">
+              <a:schemeClr val="accent1"/>
+            </a:effectRef>
+            <a:fontRef idx="minor">
+              <a:schemeClr val="tx1"/>
+            </a:fontRef>
+          </p:style>
+          <p:txBody>
+            <a:bodyPr rtlCol="0" anchor="ctr"/>
+            <a:lstStyle/>
+            <a:p>
+              <a:pPr algn="ctr"/>
+              <a:endParaRPr lang="ru-RU" sz="1100">
+                <a:latin typeface="Times New Roman" panose="02020603050405020304" pitchFamily="18" charset="0"/>
+                <a:cs typeface="Times New Roman" panose="02020603050405020304" pitchFamily="18" charset="0"/>
+              </a:endParaRPr>
+            </a:p>
+          </p:txBody>
+        </p:sp>
+        <p:sp>
+          <p:nvSpPr>
+            <p:cNvPr id="27" name="Левая фигурная скобка 26"/>
+            <p:cNvSpPr/>
+            <p:nvPr/>
+          </p:nvSpPr>
+          <p:spPr>
+            <a:xfrm>
+              <a:off x="1619880" y="2907551"/>
+              <a:ext cx="276225" cy="1305163"/>
+            </a:xfrm>
+            <a:prstGeom prst="leftBrace">
+              <a:avLst>
+                <a:gd name="adj1" fmla="val 35919"/>
+                <a:gd name="adj2" fmla="val 50629"/>
+              </a:avLst>
+            </a:prstGeom>
+            <a:ln w="28575">
+              <a:solidFill>
+                <a:srgbClr val="0070C0"/>
+              </a:solidFill>
+            </a:ln>
+          </p:spPr>
+          <p:style>
+            <a:lnRef idx="1">
+              <a:schemeClr val="accent1"/>
+            </a:lnRef>
+            <a:fillRef idx="0">
+              <a:schemeClr val="accent1"/>
+            </a:fillRef>
+            <a:effectRef idx="0">
+              <a:schemeClr val="accent1"/>
+            </a:effectRef>
+            <a:fontRef idx="minor">
+              <a:schemeClr val="tx1"/>
+            </a:fontRef>
+          </p:style>
+          <p:txBody>
+            <a:bodyPr rtlCol="0" anchor="ctr"/>
+            <a:lstStyle/>
+            <a:p>
+              <a:pPr algn="ctr"/>
+              <a:endParaRPr lang="ru-RU" sz="1100">
+                <a:latin typeface="Times New Roman" panose="02020603050405020304" pitchFamily="18" charset="0"/>
+                <a:cs typeface="Times New Roman" panose="02020603050405020304" pitchFamily="18" charset="0"/>
+              </a:endParaRPr>
+            </a:p>
+          </p:txBody>
+        </p:sp>
+        <p:cxnSp>
+          <p:nvCxnSpPr>
+            <p:cNvPr id="28" name="Прямая со стрелкой 27"/>
+            <p:cNvCxnSpPr/>
+            <p:nvPr/>
+          </p:nvCxnSpPr>
+          <p:spPr>
+            <a:xfrm>
+              <a:off x="1646074" y="993026"/>
+              <a:ext cx="269081" cy="0"/>
+            </a:xfrm>
+            <a:prstGeom prst="straightConnector1">
+              <a:avLst/>
+            </a:prstGeom>
+            <a:ln w="47625">
+              <a:tailEnd type="stealth" w="lg" len="lg"/>
+            </a:ln>
+          </p:spPr>
+          <p:style>
+            <a:lnRef idx="1">
+              <a:schemeClr val="accent1"/>
+            </a:lnRef>
+            <a:fillRef idx="0">
+              <a:schemeClr val="accent1"/>
+            </a:fillRef>
+            <a:effectRef idx="0">
+              <a:schemeClr val="accent1"/>
+            </a:effectRef>
+            <a:fontRef idx="minor">
+              <a:schemeClr val="tx1"/>
+            </a:fontRef>
+          </p:style>
+        </p:cxnSp>
+        <p:cxnSp>
+          <p:nvCxnSpPr>
+            <p:cNvPr id="29" name="Прямая со стрелкой 28"/>
+            <p:cNvCxnSpPr/>
+            <p:nvPr/>
+          </p:nvCxnSpPr>
+          <p:spPr>
+            <a:xfrm>
+              <a:off x="1669886" y="2717051"/>
+              <a:ext cx="269081" cy="0"/>
+            </a:xfrm>
+            <a:prstGeom prst="straightConnector1">
+              <a:avLst/>
+            </a:prstGeom>
+            <a:ln w="47625">
+              <a:tailEnd type="stealth" w="lg" len="lg"/>
+            </a:ln>
+          </p:spPr>
+          <p:style>
+            <a:lnRef idx="1">
+              <a:schemeClr val="accent1"/>
+            </a:lnRef>
+            <a:fillRef idx="0">
+              <a:schemeClr val="accent1"/>
+            </a:fillRef>
+            <a:effectRef idx="0">
+              <a:schemeClr val="accent1"/>
+            </a:effectRef>
+            <a:fontRef idx="minor">
+              <a:schemeClr val="tx1"/>
+            </a:fontRef>
+          </p:style>
+        </p:cxnSp>
+        <p:sp>
+          <p:nvSpPr>
+            <p:cNvPr id="30" name="TextBox 29"/>
+            <p:cNvSpPr txBox="1"/>
+            <p:nvPr/>
+          </p:nvSpPr>
+          <p:spPr>
+            <a:xfrm>
+              <a:off x="991230" y="814194"/>
+              <a:ext cx="590550" cy="261610"/>
+            </a:xfrm>
+            <a:prstGeom prst="rect">
+              <a:avLst/>
+            </a:prstGeom>
+            <a:noFill/>
+          </p:spPr>
+          <p:txBody>
+            <a:bodyPr wrap="square" rtlCol="0">
+              <a:spAutoFit/>
+            </a:bodyPr>
+            <a:lstStyle/>
+            <a:p>
+              <a:pPr algn="ctr"/>
+              <a:r>
+                <a:rPr lang="ru-RU" sz="1100" dirty="0">
+                  <a:latin typeface="Times New Roman" panose="02020603050405020304" pitchFamily="18" charset="0"/>
+                  <a:cs typeface="Times New Roman" panose="02020603050405020304" pitchFamily="18" charset="0"/>
+                </a:rPr>
+                <a:t>Меню</a:t>
+              </a:r>
+            </a:p>
+          </p:txBody>
+        </p:sp>
+        <p:sp>
+          <p:nvSpPr>
+            <p:cNvPr id="31" name="TextBox 30"/>
+            <p:cNvSpPr txBox="1"/>
+            <p:nvPr/>
+          </p:nvSpPr>
+          <p:spPr>
+            <a:xfrm>
+              <a:off x="76831" y="1829316"/>
+              <a:ext cx="1485900" cy="261610"/>
+            </a:xfrm>
+            <a:prstGeom prst="rect">
+              <a:avLst/>
+            </a:prstGeom>
+            <a:noFill/>
+          </p:spPr>
+          <p:txBody>
+            <a:bodyPr wrap="square" rtlCol="0">
+              <a:spAutoFit/>
+            </a:bodyPr>
+            <a:lstStyle/>
+            <a:p>
+              <a:pPr algn="ctr"/>
+              <a:r>
+                <a:rPr lang="ru-RU" sz="1100" dirty="0">
+                  <a:latin typeface="Times New Roman" panose="02020603050405020304" pitchFamily="18" charset="0"/>
+                  <a:cs typeface="Times New Roman" panose="02020603050405020304" pitchFamily="18" charset="0"/>
+                </a:rPr>
+                <a:t>Слоистая структура</a:t>
+              </a:r>
+            </a:p>
+          </p:txBody>
+        </p:sp>
+        <p:sp>
+          <p:nvSpPr>
+            <p:cNvPr id="32" name="TextBox 31"/>
+            <p:cNvSpPr txBox="1"/>
+            <p:nvPr/>
+          </p:nvSpPr>
+          <p:spPr>
+            <a:xfrm>
+              <a:off x="372105" y="2522858"/>
+              <a:ext cx="1199555" cy="430887"/>
+            </a:xfrm>
+            <a:prstGeom prst="rect">
+              <a:avLst/>
+            </a:prstGeom>
+            <a:noFill/>
+          </p:spPr>
+          <p:txBody>
+            <a:bodyPr wrap="square" rtlCol="0">
+              <a:spAutoFit/>
+            </a:bodyPr>
+            <a:lstStyle/>
+            <a:p>
+              <a:pPr algn="ctr"/>
+              <a:r>
+                <a:rPr lang="ru-RU" sz="1100" dirty="0">
+                  <a:latin typeface="Times New Roman" panose="02020603050405020304" pitchFamily="18" charset="0"/>
+                  <a:cs typeface="Times New Roman" panose="02020603050405020304" pitchFamily="18" charset="0"/>
+                </a:rPr>
+                <a:t>Панель инструментов</a:t>
+              </a:r>
+            </a:p>
+          </p:txBody>
+        </p:sp>
+        <p:sp>
+          <p:nvSpPr>
+            <p:cNvPr id="33" name="TextBox 32"/>
+            <p:cNvSpPr txBox="1"/>
+            <p:nvPr/>
+          </p:nvSpPr>
+          <p:spPr>
+            <a:xfrm>
+              <a:off x="219705" y="3429327"/>
+              <a:ext cx="1269652" cy="430887"/>
+            </a:xfrm>
+            <a:prstGeom prst="rect">
+              <a:avLst/>
+            </a:prstGeom>
+            <a:noFill/>
+          </p:spPr>
+          <p:txBody>
+            <a:bodyPr wrap="square" rtlCol="0">
+              <a:spAutoFit/>
+            </a:bodyPr>
+            <a:lstStyle/>
+            <a:p>
+              <a:pPr algn="ctr"/>
+              <a:r>
+                <a:rPr lang="ru-RU" sz="1100" dirty="0">
+                  <a:latin typeface="Times New Roman" panose="02020603050405020304" pitchFamily="18" charset="0"/>
+                  <a:cs typeface="Times New Roman" panose="02020603050405020304" pitchFamily="18" charset="0"/>
+                </a:rPr>
+                <a:t>Доступ к остальным окнам</a:t>
+              </a:r>
+            </a:p>
+          </p:txBody>
+        </p:sp>
+        <p:sp>
+          <p:nvSpPr>
+            <p:cNvPr id="34" name="TextBox 33"/>
+            <p:cNvSpPr txBox="1"/>
+            <p:nvPr/>
+          </p:nvSpPr>
+          <p:spPr>
+            <a:xfrm>
+              <a:off x="24813" y="5479687"/>
+              <a:ext cx="1595067" cy="430887"/>
+            </a:xfrm>
+            <a:prstGeom prst="rect">
+              <a:avLst/>
+            </a:prstGeom>
+            <a:noFill/>
+          </p:spPr>
+          <p:txBody>
+            <a:bodyPr wrap="square" rtlCol="0">
+              <a:spAutoFit/>
+            </a:bodyPr>
+            <a:lstStyle/>
+            <a:p>
+              <a:pPr algn="ctr"/>
+              <a:r>
+                <a:rPr lang="ru-RU" sz="1100" dirty="0">
+                  <a:latin typeface="Times New Roman" panose="02020603050405020304" pitchFamily="18" charset="0"/>
+                  <a:cs typeface="Times New Roman" panose="02020603050405020304" pitchFamily="18" charset="0"/>
+                </a:rPr>
+                <a:t>Экспериментальные данные</a:t>
+              </a:r>
+            </a:p>
+          </p:txBody>
+        </p:sp>
+        <p:sp>
+          <p:nvSpPr>
+            <p:cNvPr id="35" name="Левая фигурная скобка 34"/>
+            <p:cNvSpPr/>
+            <p:nvPr/>
+          </p:nvSpPr>
+          <p:spPr>
+            <a:xfrm>
+              <a:off x="1620477" y="5031626"/>
+              <a:ext cx="276225" cy="1362074"/>
+            </a:xfrm>
+            <a:prstGeom prst="leftBrace">
+              <a:avLst>
+                <a:gd name="adj1" fmla="val 35919"/>
+                <a:gd name="adj2" fmla="val 50629"/>
+              </a:avLst>
+            </a:prstGeom>
+            <a:ln w="28575">
+              <a:solidFill>
+                <a:srgbClr val="0070C0"/>
+              </a:solidFill>
+            </a:ln>
+          </p:spPr>
+          <p:style>
+            <a:lnRef idx="1">
+              <a:schemeClr val="accent1"/>
+            </a:lnRef>
+            <a:fillRef idx="0">
+              <a:schemeClr val="accent1"/>
+            </a:fillRef>
+            <a:effectRef idx="0">
+              <a:schemeClr val="accent1"/>
+            </a:effectRef>
+            <a:fontRef idx="minor">
+              <a:schemeClr val="tx1"/>
+            </a:fontRef>
+          </p:style>
+          <p:txBody>
+            <a:bodyPr rtlCol="0" anchor="ctr"/>
+            <a:lstStyle/>
+            <a:p>
+              <a:pPr algn="ctr"/>
+              <a:endParaRPr lang="ru-RU" sz="1100">
+                <a:latin typeface="Times New Roman" panose="02020603050405020304" pitchFamily="18" charset="0"/>
+                <a:cs typeface="Times New Roman" panose="02020603050405020304" pitchFamily="18" charset="0"/>
+              </a:endParaRPr>
+            </a:p>
+          </p:txBody>
+        </p:sp>
+        <p:sp>
+          <p:nvSpPr>
+            <p:cNvPr id="36" name="Левая фигурная скобка 35"/>
+            <p:cNvSpPr/>
+            <p:nvPr/>
+          </p:nvSpPr>
+          <p:spPr>
+            <a:xfrm>
+              <a:off x="1618911" y="4279150"/>
+              <a:ext cx="276225" cy="673864"/>
+            </a:xfrm>
+            <a:prstGeom prst="leftBrace">
+              <a:avLst>
+                <a:gd name="adj1" fmla="val 35919"/>
+                <a:gd name="adj2" fmla="val 50629"/>
+              </a:avLst>
+            </a:prstGeom>
+            <a:ln w="28575">
+              <a:solidFill>
+                <a:srgbClr val="0070C0"/>
+              </a:solidFill>
+            </a:ln>
+          </p:spPr>
+          <p:style>
+            <a:lnRef idx="1">
+              <a:schemeClr val="accent1"/>
+            </a:lnRef>
+            <a:fillRef idx="0">
+              <a:schemeClr val="accent1"/>
+            </a:fillRef>
+            <a:effectRef idx="0">
+              <a:schemeClr val="accent1"/>
+            </a:effectRef>
+            <a:fontRef idx="minor">
+              <a:schemeClr val="tx1"/>
+            </a:fontRef>
+          </p:style>
+          <p:txBody>
+            <a:bodyPr rtlCol="0" anchor="ctr"/>
+            <a:lstStyle/>
+            <a:p>
+              <a:pPr algn="ctr"/>
+              <a:endParaRPr lang="ru-RU" sz="1100">
+                <a:latin typeface="Times New Roman" panose="02020603050405020304" pitchFamily="18" charset="0"/>
+                <a:cs typeface="Times New Roman" panose="02020603050405020304" pitchFamily="18" charset="0"/>
+              </a:endParaRPr>
+            </a:p>
+          </p:txBody>
+        </p:sp>
+        <p:sp>
+          <p:nvSpPr>
+            <p:cNvPr id="37" name="TextBox 36"/>
+            <p:cNvSpPr txBox="1"/>
+            <p:nvPr/>
+          </p:nvSpPr>
+          <p:spPr>
+            <a:xfrm>
+              <a:off x="76830" y="4331236"/>
+              <a:ext cx="1385586" cy="600164"/>
+            </a:xfrm>
+            <a:prstGeom prst="rect">
+              <a:avLst/>
+            </a:prstGeom>
+            <a:noFill/>
+          </p:spPr>
+          <p:txBody>
+            <a:bodyPr wrap="square" rtlCol="0">
+              <a:spAutoFit/>
+            </a:bodyPr>
+            <a:lstStyle/>
+            <a:p>
+              <a:pPr algn="ctr"/>
+              <a:r>
+                <a:rPr lang="ru-RU" sz="1100" dirty="0">
+                  <a:latin typeface="Times New Roman" panose="02020603050405020304" pitchFamily="18" charset="0"/>
+                  <a:cs typeface="Times New Roman" panose="02020603050405020304" pitchFamily="18" charset="0"/>
+                </a:rPr>
+                <a:t>Кривые без экспериментальных данных</a:t>
+              </a:r>
+            </a:p>
+          </p:txBody>
+        </p:sp>
+        <p:cxnSp>
+          <p:nvCxnSpPr>
+            <p:cNvPr id="38" name="Прямая со стрелкой 37"/>
+            <p:cNvCxnSpPr/>
+            <p:nvPr/>
+          </p:nvCxnSpPr>
+          <p:spPr>
+            <a:xfrm>
+              <a:off x="1655972" y="1253807"/>
+              <a:ext cx="269081" cy="0"/>
+            </a:xfrm>
+            <a:prstGeom prst="straightConnector1">
+              <a:avLst/>
+            </a:prstGeom>
+            <a:ln w="47625">
+              <a:tailEnd type="stealth" w="lg" len="lg"/>
+            </a:ln>
+          </p:spPr>
+          <p:style>
+            <a:lnRef idx="1">
+              <a:schemeClr val="accent1"/>
+            </a:lnRef>
+            <a:fillRef idx="0">
+              <a:schemeClr val="accent1"/>
+            </a:fillRef>
+            <a:effectRef idx="0">
+              <a:schemeClr val="accent1"/>
+            </a:effectRef>
+            <a:fontRef idx="minor">
+              <a:schemeClr val="tx1"/>
+            </a:fontRef>
+          </p:style>
+        </p:cxnSp>
+        <p:sp>
+          <p:nvSpPr>
+            <p:cNvPr id="39" name="TextBox 38"/>
+            <p:cNvSpPr txBox="1"/>
+            <p:nvPr/>
+          </p:nvSpPr>
+          <p:spPr>
+            <a:xfrm>
+              <a:off x="219705" y="1087827"/>
+              <a:ext cx="1426368" cy="430887"/>
+            </a:xfrm>
+            <a:prstGeom prst="rect">
+              <a:avLst/>
+            </a:prstGeom>
+            <a:noFill/>
+          </p:spPr>
+          <p:txBody>
+            <a:bodyPr wrap="square" rtlCol="0">
+              <a:spAutoFit/>
+            </a:bodyPr>
+            <a:lstStyle/>
+            <a:p>
+              <a:pPr algn="ctr"/>
+              <a:r>
+                <a:rPr lang="ru-RU" sz="1100" dirty="0">
+                  <a:latin typeface="Times New Roman" panose="02020603050405020304" pitchFamily="18" charset="0"/>
+                  <a:cs typeface="Times New Roman" panose="02020603050405020304" pitchFamily="18" charset="0"/>
+                </a:rPr>
+                <a:t>Вкладки со структурами</a:t>
+              </a:r>
+            </a:p>
+          </p:txBody>
+        </p:sp>
         <p:pic>
           <p:nvPicPr>
-            <p:cNvPr id="24" name="Рисунок 23"/>
+            <p:cNvPr id="4" name="Picture 3">
+              <a:extLst>
+                <a:ext uri="{FF2B5EF4-FFF2-40B4-BE49-F238E27FC236}">
+                  <a16:creationId xmlns:a16="http://schemas.microsoft.com/office/drawing/2014/main" id="{8E344795-A679-D9AB-49CC-BEB98FE7C03A}"/>
+                </a:ext>
+              </a:extLst>
+            </p:cNvPr>
             <p:cNvPicPr>
               <a:picLocks noChangeAspect="1"/>
             </p:cNvPicPr>
@@ -3031,14 +3569,35 @@
           </p:blipFill>
           <p:spPr>
             <a:xfrm>
-              <a:off x="3226148" y="597648"/>
-              <a:ext cx="3105150" cy="5857875"/>
+              <a:off x="2034686" y="575164"/>
+              <a:ext cx="2876550" cy="5848350"/>
             </a:xfrm>
             <a:prstGeom prst="rect">
               <a:avLst/>
             </a:prstGeom>
           </p:spPr>
         </p:pic>
+      </p:grpSp>
+      <p:grpSp>
+        <p:nvGrpSpPr>
+          <p:cNvPr id="6" name="Group 5">
+            <a:extLst>
+              <a:ext uri="{FF2B5EF4-FFF2-40B4-BE49-F238E27FC236}">
+                <a16:creationId xmlns:a16="http://schemas.microsoft.com/office/drawing/2014/main" id="{B40771BB-91BD-A6EC-7C06-DD223AC8F08C}"/>
+              </a:ext>
+            </a:extLst>
+          </p:cNvPr>
+          <p:cNvGrpSpPr/>
+          <p:nvPr/>
+        </p:nvGrpSpPr>
+        <p:grpSpPr>
+          <a:xfrm>
+            <a:off x="5533577" y="578095"/>
+            <a:ext cx="4664767" cy="5848350"/>
+            <a:chOff x="5533577" y="578095"/>
+            <a:chExt cx="4664767" cy="5848350"/>
+          </a:xfrm>
+        </p:grpSpPr>
         <p:sp>
           <p:nvSpPr>
             <p:cNvPr id="9" name="Левая фигурная скобка 8"/>
@@ -3047,7 +3606,7 @@
           </p:nvSpPr>
           <p:spPr>
             <a:xfrm>
-              <a:off x="2819400" y="1448840"/>
+              <a:off x="6916638" y="1422690"/>
               <a:ext cx="276225" cy="1122910"/>
             </a:xfrm>
             <a:prstGeom prst="leftBrace">
@@ -3096,7 +3655,7 @@
           </p:nvSpPr>
           <p:spPr>
             <a:xfrm>
-              <a:off x="2819400" y="2933700"/>
+              <a:off x="6916638" y="2907550"/>
               <a:ext cx="276225" cy="1305163"/>
             </a:xfrm>
             <a:prstGeom prst="leftBrace">
@@ -3145,7 +3704,7 @@
           </p:nvCxnSpPr>
           <p:spPr>
             <a:xfrm>
-              <a:off x="2845594" y="1019175"/>
+              <a:off x="6942832" y="993025"/>
               <a:ext cx="269081" cy="0"/>
             </a:xfrm>
             <a:prstGeom prst="straightConnector1">
@@ -3178,7 +3737,7 @@
           </p:nvCxnSpPr>
           <p:spPr>
             <a:xfrm>
-              <a:off x="2869406" y="2743200"/>
+              <a:off x="6966644" y="2717050"/>
               <a:ext cx="269081" cy="0"/>
             </a:xfrm>
             <a:prstGeom prst="straightConnector1">
@@ -3211,7 +3770,7 @@
           </p:nvSpPr>
           <p:spPr>
             <a:xfrm>
-              <a:off x="1965722" y="830818"/>
+              <a:off x="6062960" y="804668"/>
               <a:ext cx="796528" cy="261610"/>
             </a:xfrm>
             <a:prstGeom prst="rect">
@@ -3248,7 +3807,7 @@
           </p:nvSpPr>
           <p:spPr>
             <a:xfrm>
-              <a:off x="1552575" y="1855465"/>
+              <a:off x="5649813" y="1829315"/>
               <a:ext cx="1209675" cy="261610"/>
             </a:xfrm>
             <a:prstGeom prst="rect">
@@ -3285,7 +3844,7 @@
           </p:nvSpPr>
           <p:spPr>
             <a:xfrm>
-              <a:off x="1660327" y="2606157"/>
+              <a:off x="5757565" y="2580007"/>
               <a:ext cx="1110853" cy="261610"/>
             </a:xfrm>
             <a:prstGeom prst="rect">
@@ -3322,7 +3881,7 @@
           </p:nvSpPr>
           <p:spPr>
             <a:xfrm>
-              <a:off x="1552575" y="3422210"/>
+              <a:off x="5649813" y="3396060"/>
               <a:ext cx="1136302" cy="430887"/>
             </a:xfrm>
             <a:prstGeom prst="rect">
@@ -3359,7 +3918,7 @@
           </p:nvSpPr>
           <p:spPr>
             <a:xfrm>
-              <a:off x="1488466" y="5497161"/>
+              <a:off x="5585704" y="5471011"/>
               <a:ext cx="1318841" cy="430887"/>
             </a:xfrm>
             <a:prstGeom prst="rect">
@@ -3396,7 +3955,7 @@
           </p:nvSpPr>
           <p:spPr>
             <a:xfrm>
-              <a:off x="2819997" y="5057775"/>
+              <a:off x="6917235" y="5031625"/>
               <a:ext cx="276225" cy="1362074"/>
             </a:xfrm>
             <a:prstGeom prst="leftBrace">
@@ -3445,7 +4004,7 @@
           </p:nvSpPr>
           <p:spPr>
             <a:xfrm>
-              <a:off x="2818431" y="4305299"/>
+              <a:off x="6915669" y="4279149"/>
               <a:ext cx="276225" cy="673864"/>
             </a:xfrm>
             <a:prstGeom prst="leftBrace">
@@ -3494,7 +4053,7 @@
           </p:nvSpPr>
           <p:spPr>
             <a:xfrm>
-              <a:off x="1436339" y="4426787"/>
+              <a:off x="5533577" y="4400637"/>
               <a:ext cx="1368773" cy="430887"/>
             </a:xfrm>
             <a:prstGeom prst="rect">
@@ -3531,7 +4090,7 @@
           </p:nvCxnSpPr>
           <p:spPr>
             <a:xfrm>
-              <a:off x="2855492" y="1279956"/>
+              <a:off x="6952730" y="1253806"/>
               <a:ext cx="269081" cy="0"/>
             </a:xfrm>
             <a:prstGeom prst="straightConnector1">
@@ -3564,7 +4123,7 @@
           </p:nvSpPr>
           <p:spPr>
             <a:xfrm>
-              <a:off x="1463407" y="1161602"/>
+              <a:off x="5560645" y="1135452"/>
               <a:ext cx="1388009" cy="261610"/>
             </a:xfrm>
             <a:prstGeom prst="rect">
@@ -3593,550 +4152,15 @@
             </a:p>
           </p:txBody>
         </p:sp>
-      </p:grpSp>
-      <p:grpSp>
-        <p:nvGrpSpPr>
-          <p:cNvPr id="25" name="Группа 24"/>
-          <p:cNvGrpSpPr/>
-          <p:nvPr/>
-        </p:nvGrpSpPr>
-        <p:grpSpPr>
-          <a:xfrm>
-            <a:off x="24813" y="571499"/>
-            <a:ext cx="5106965" cy="5857875"/>
-            <a:chOff x="1224333" y="597648"/>
-            <a:chExt cx="5106965" cy="5857875"/>
-          </a:xfrm>
-        </p:grpSpPr>
-        <p:sp>
-          <p:nvSpPr>
-            <p:cNvPr id="26" name="Левая фигурная скобка 25"/>
-            <p:cNvSpPr/>
-            <p:nvPr/>
-          </p:nvSpPr>
-          <p:spPr>
-            <a:xfrm>
-              <a:off x="2819400" y="1448840"/>
-              <a:ext cx="276225" cy="1122910"/>
-            </a:xfrm>
-            <a:prstGeom prst="leftBrace">
-              <a:avLst>
-                <a:gd name="adj1" fmla="val 35919"/>
-                <a:gd name="adj2" fmla="val 50629"/>
-              </a:avLst>
-            </a:prstGeom>
-            <a:ln w="28575">
-              <a:solidFill>
-                <a:srgbClr val="0070C0"/>
-              </a:solidFill>
-            </a:ln>
-          </p:spPr>
-          <p:style>
-            <a:lnRef idx="1">
-              <a:schemeClr val="accent1"/>
-            </a:lnRef>
-            <a:fillRef idx="0">
-              <a:schemeClr val="accent1"/>
-            </a:fillRef>
-            <a:effectRef idx="0">
-              <a:schemeClr val="accent1"/>
-            </a:effectRef>
-            <a:fontRef idx="minor">
-              <a:schemeClr val="tx1"/>
-            </a:fontRef>
-          </p:style>
-          <p:txBody>
-            <a:bodyPr rtlCol="0" anchor="ctr"/>
-            <a:lstStyle/>
-            <a:p>
-              <a:pPr algn="ctr"/>
-              <a:endParaRPr lang="ru-RU" sz="1100">
-                <a:latin typeface="Times New Roman" panose="02020603050405020304" pitchFamily="18" charset="0"/>
-                <a:cs typeface="Times New Roman" panose="02020603050405020304" pitchFamily="18" charset="0"/>
-              </a:endParaRPr>
-            </a:p>
-          </p:txBody>
-        </p:sp>
-        <p:sp>
-          <p:nvSpPr>
-            <p:cNvPr id="27" name="Левая фигурная скобка 26"/>
-            <p:cNvSpPr/>
-            <p:nvPr/>
-          </p:nvSpPr>
-          <p:spPr>
-            <a:xfrm>
-              <a:off x="2819400" y="2933700"/>
-              <a:ext cx="276225" cy="1305163"/>
-            </a:xfrm>
-            <a:prstGeom prst="leftBrace">
-              <a:avLst>
-                <a:gd name="adj1" fmla="val 35919"/>
-                <a:gd name="adj2" fmla="val 50629"/>
-              </a:avLst>
-            </a:prstGeom>
-            <a:ln w="28575">
-              <a:solidFill>
-                <a:srgbClr val="0070C0"/>
-              </a:solidFill>
-            </a:ln>
-          </p:spPr>
-          <p:style>
-            <a:lnRef idx="1">
-              <a:schemeClr val="accent1"/>
-            </a:lnRef>
-            <a:fillRef idx="0">
-              <a:schemeClr val="accent1"/>
-            </a:fillRef>
-            <a:effectRef idx="0">
-              <a:schemeClr val="accent1"/>
-            </a:effectRef>
-            <a:fontRef idx="minor">
-              <a:schemeClr val="tx1"/>
-            </a:fontRef>
-          </p:style>
-          <p:txBody>
-            <a:bodyPr rtlCol="0" anchor="ctr"/>
-            <a:lstStyle/>
-            <a:p>
-              <a:pPr algn="ctr"/>
-              <a:endParaRPr lang="ru-RU" sz="1100">
-                <a:latin typeface="Times New Roman" panose="02020603050405020304" pitchFamily="18" charset="0"/>
-                <a:cs typeface="Times New Roman" panose="02020603050405020304" pitchFamily="18" charset="0"/>
-              </a:endParaRPr>
-            </a:p>
-          </p:txBody>
-        </p:sp>
-        <p:cxnSp>
-          <p:nvCxnSpPr>
-            <p:cNvPr id="28" name="Прямая со стрелкой 27"/>
-            <p:cNvCxnSpPr/>
-            <p:nvPr/>
-          </p:nvCxnSpPr>
-          <p:spPr>
-            <a:xfrm>
-              <a:off x="2845594" y="1019175"/>
-              <a:ext cx="269081" cy="0"/>
-            </a:xfrm>
-            <a:prstGeom prst="straightConnector1">
-              <a:avLst/>
-            </a:prstGeom>
-            <a:ln w="47625">
-              <a:tailEnd type="stealth" w="lg" len="lg"/>
-            </a:ln>
-          </p:spPr>
-          <p:style>
-            <a:lnRef idx="1">
-              <a:schemeClr val="accent1"/>
-            </a:lnRef>
-            <a:fillRef idx="0">
-              <a:schemeClr val="accent1"/>
-            </a:fillRef>
-            <a:effectRef idx="0">
-              <a:schemeClr val="accent1"/>
-            </a:effectRef>
-            <a:fontRef idx="minor">
-              <a:schemeClr val="tx1"/>
-            </a:fontRef>
-          </p:style>
-        </p:cxnSp>
-        <p:cxnSp>
-          <p:nvCxnSpPr>
-            <p:cNvPr id="29" name="Прямая со стрелкой 28"/>
-            <p:cNvCxnSpPr/>
-            <p:nvPr/>
-          </p:nvCxnSpPr>
-          <p:spPr>
-            <a:xfrm>
-              <a:off x="2869406" y="2743200"/>
-              <a:ext cx="269081" cy="0"/>
-            </a:xfrm>
-            <a:prstGeom prst="straightConnector1">
-              <a:avLst/>
-            </a:prstGeom>
-            <a:ln w="47625">
-              <a:tailEnd type="stealth" w="lg" len="lg"/>
-            </a:ln>
-          </p:spPr>
-          <p:style>
-            <a:lnRef idx="1">
-              <a:schemeClr val="accent1"/>
-            </a:lnRef>
-            <a:fillRef idx="0">
-              <a:schemeClr val="accent1"/>
-            </a:fillRef>
-            <a:effectRef idx="0">
-              <a:schemeClr val="accent1"/>
-            </a:effectRef>
-            <a:fontRef idx="minor">
-              <a:schemeClr val="tx1"/>
-            </a:fontRef>
-          </p:style>
-        </p:cxnSp>
-        <p:sp>
-          <p:nvSpPr>
-            <p:cNvPr id="30" name="TextBox 29"/>
-            <p:cNvSpPr txBox="1"/>
-            <p:nvPr/>
-          </p:nvSpPr>
-          <p:spPr>
-            <a:xfrm>
-              <a:off x="2190750" y="840343"/>
-              <a:ext cx="590550" cy="261610"/>
-            </a:xfrm>
-            <a:prstGeom prst="rect">
-              <a:avLst/>
-            </a:prstGeom>
-            <a:noFill/>
-          </p:spPr>
-          <p:txBody>
-            <a:bodyPr wrap="square" rtlCol="0">
-              <a:spAutoFit/>
-            </a:bodyPr>
-            <a:lstStyle/>
-            <a:p>
-              <a:pPr algn="ctr"/>
-              <a:r>
-                <a:rPr lang="ru-RU" sz="1100" dirty="0">
-                  <a:latin typeface="Times New Roman" panose="02020603050405020304" pitchFamily="18" charset="0"/>
-                  <a:cs typeface="Times New Roman" panose="02020603050405020304" pitchFamily="18" charset="0"/>
-                </a:rPr>
-                <a:t>Меню</a:t>
-              </a:r>
-            </a:p>
-          </p:txBody>
-        </p:sp>
-        <p:sp>
-          <p:nvSpPr>
-            <p:cNvPr id="31" name="TextBox 30"/>
-            <p:cNvSpPr txBox="1"/>
-            <p:nvPr/>
-          </p:nvSpPr>
-          <p:spPr>
-            <a:xfrm>
-              <a:off x="1276351" y="1855465"/>
-              <a:ext cx="1485900" cy="261610"/>
-            </a:xfrm>
-            <a:prstGeom prst="rect">
-              <a:avLst/>
-            </a:prstGeom>
-            <a:noFill/>
-          </p:spPr>
-          <p:txBody>
-            <a:bodyPr wrap="square" rtlCol="0">
-              <a:spAutoFit/>
-            </a:bodyPr>
-            <a:lstStyle/>
-            <a:p>
-              <a:pPr algn="ctr"/>
-              <a:r>
-                <a:rPr lang="ru-RU" sz="1100" dirty="0">
-                  <a:latin typeface="Times New Roman" panose="02020603050405020304" pitchFamily="18" charset="0"/>
-                  <a:cs typeface="Times New Roman" panose="02020603050405020304" pitchFamily="18" charset="0"/>
-                </a:rPr>
-                <a:t>Слоистая структура</a:t>
-              </a:r>
-            </a:p>
-          </p:txBody>
-        </p:sp>
-        <p:sp>
-          <p:nvSpPr>
-            <p:cNvPr id="32" name="TextBox 31"/>
-            <p:cNvSpPr txBox="1"/>
-            <p:nvPr/>
-          </p:nvSpPr>
-          <p:spPr>
-            <a:xfrm>
-              <a:off x="1571625" y="2549007"/>
-              <a:ext cx="1199555" cy="430887"/>
-            </a:xfrm>
-            <a:prstGeom prst="rect">
-              <a:avLst/>
-            </a:prstGeom>
-            <a:noFill/>
-          </p:spPr>
-          <p:txBody>
-            <a:bodyPr wrap="square" rtlCol="0">
-              <a:spAutoFit/>
-            </a:bodyPr>
-            <a:lstStyle/>
-            <a:p>
-              <a:pPr algn="ctr"/>
-              <a:r>
-                <a:rPr lang="ru-RU" sz="1100" dirty="0">
-                  <a:latin typeface="Times New Roman" panose="02020603050405020304" pitchFamily="18" charset="0"/>
-                  <a:cs typeface="Times New Roman" panose="02020603050405020304" pitchFamily="18" charset="0"/>
-                </a:rPr>
-                <a:t>Панель инструментов</a:t>
-              </a:r>
-            </a:p>
-          </p:txBody>
-        </p:sp>
-        <p:sp>
-          <p:nvSpPr>
-            <p:cNvPr id="33" name="TextBox 32"/>
-            <p:cNvSpPr txBox="1"/>
-            <p:nvPr/>
-          </p:nvSpPr>
-          <p:spPr>
-            <a:xfrm>
-              <a:off x="1419225" y="3455476"/>
-              <a:ext cx="1269652" cy="430887"/>
-            </a:xfrm>
-            <a:prstGeom prst="rect">
-              <a:avLst/>
-            </a:prstGeom>
-            <a:noFill/>
-          </p:spPr>
-          <p:txBody>
-            <a:bodyPr wrap="square" rtlCol="0">
-              <a:spAutoFit/>
-            </a:bodyPr>
-            <a:lstStyle/>
-            <a:p>
-              <a:pPr algn="ctr"/>
-              <a:r>
-                <a:rPr lang="ru-RU" sz="1100" dirty="0">
-                  <a:latin typeface="Times New Roman" panose="02020603050405020304" pitchFamily="18" charset="0"/>
-                  <a:cs typeface="Times New Roman" panose="02020603050405020304" pitchFamily="18" charset="0"/>
-                </a:rPr>
-                <a:t>Доступ к остальным окнам</a:t>
-              </a:r>
-            </a:p>
-          </p:txBody>
-        </p:sp>
-        <p:sp>
-          <p:nvSpPr>
-            <p:cNvPr id="34" name="TextBox 33"/>
-            <p:cNvSpPr txBox="1"/>
-            <p:nvPr/>
-          </p:nvSpPr>
-          <p:spPr>
-            <a:xfrm>
-              <a:off x="1224333" y="5505836"/>
-              <a:ext cx="1595067" cy="430887"/>
-            </a:xfrm>
-            <a:prstGeom prst="rect">
-              <a:avLst/>
-            </a:prstGeom>
-            <a:noFill/>
-          </p:spPr>
-          <p:txBody>
-            <a:bodyPr wrap="square" rtlCol="0">
-              <a:spAutoFit/>
-            </a:bodyPr>
-            <a:lstStyle/>
-            <a:p>
-              <a:pPr algn="ctr"/>
-              <a:r>
-                <a:rPr lang="ru-RU" sz="1100" dirty="0">
-                  <a:latin typeface="Times New Roman" panose="02020603050405020304" pitchFamily="18" charset="0"/>
-                  <a:cs typeface="Times New Roman" panose="02020603050405020304" pitchFamily="18" charset="0"/>
-                </a:rPr>
-                <a:t>Экспериментальные данные</a:t>
-              </a:r>
-            </a:p>
-          </p:txBody>
-        </p:sp>
-        <p:sp>
-          <p:nvSpPr>
-            <p:cNvPr id="35" name="Левая фигурная скобка 34"/>
-            <p:cNvSpPr/>
-            <p:nvPr/>
-          </p:nvSpPr>
-          <p:spPr>
-            <a:xfrm>
-              <a:off x="2819997" y="5057775"/>
-              <a:ext cx="276225" cy="1362074"/>
-            </a:xfrm>
-            <a:prstGeom prst="leftBrace">
-              <a:avLst>
-                <a:gd name="adj1" fmla="val 35919"/>
-                <a:gd name="adj2" fmla="val 50629"/>
-              </a:avLst>
-            </a:prstGeom>
-            <a:ln w="28575">
-              <a:solidFill>
-                <a:srgbClr val="0070C0"/>
-              </a:solidFill>
-            </a:ln>
-          </p:spPr>
-          <p:style>
-            <a:lnRef idx="1">
-              <a:schemeClr val="accent1"/>
-            </a:lnRef>
-            <a:fillRef idx="0">
-              <a:schemeClr val="accent1"/>
-            </a:fillRef>
-            <a:effectRef idx="0">
-              <a:schemeClr val="accent1"/>
-            </a:effectRef>
-            <a:fontRef idx="minor">
-              <a:schemeClr val="tx1"/>
-            </a:fontRef>
-          </p:style>
-          <p:txBody>
-            <a:bodyPr rtlCol="0" anchor="ctr"/>
-            <a:lstStyle/>
-            <a:p>
-              <a:pPr algn="ctr"/>
-              <a:endParaRPr lang="ru-RU" sz="1100">
-                <a:latin typeface="Times New Roman" panose="02020603050405020304" pitchFamily="18" charset="0"/>
-                <a:cs typeface="Times New Roman" panose="02020603050405020304" pitchFamily="18" charset="0"/>
-              </a:endParaRPr>
-            </a:p>
-          </p:txBody>
-        </p:sp>
-        <p:sp>
-          <p:nvSpPr>
-            <p:cNvPr id="36" name="Левая фигурная скобка 35"/>
-            <p:cNvSpPr/>
-            <p:nvPr/>
-          </p:nvSpPr>
-          <p:spPr>
-            <a:xfrm>
-              <a:off x="2818431" y="4305299"/>
-              <a:ext cx="276225" cy="673864"/>
-            </a:xfrm>
-            <a:prstGeom prst="leftBrace">
-              <a:avLst>
-                <a:gd name="adj1" fmla="val 35919"/>
-                <a:gd name="adj2" fmla="val 50629"/>
-              </a:avLst>
-            </a:prstGeom>
-            <a:ln w="28575">
-              <a:solidFill>
-                <a:srgbClr val="0070C0"/>
-              </a:solidFill>
-            </a:ln>
-          </p:spPr>
-          <p:style>
-            <a:lnRef idx="1">
-              <a:schemeClr val="accent1"/>
-            </a:lnRef>
-            <a:fillRef idx="0">
-              <a:schemeClr val="accent1"/>
-            </a:fillRef>
-            <a:effectRef idx="0">
-              <a:schemeClr val="accent1"/>
-            </a:effectRef>
-            <a:fontRef idx="minor">
-              <a:schemeClr val="tx1"/>
-            </a:fontRef>
-          </p:style>
-          <p:txBody>
-            <a:bodyPr rtlCol="0" anchor="ctr"/>
-            <a:lstStyle/>
-            <a:p>
-              <a:pPr algn="ctr"/>
-              <a:endParaRPr lang="ru-RU" sz="1100">
-                <a:latin typeface="Times New Roman" panose="02020603050405020304" pitchFamily="18" charset="0"/>
-                <a:cs typeface="Times New Roman" panose="02020603050405020304" pitchFamily="18" charset="0"/>
-              </a:endParaRPr>
-            </a:p>
-          </p:txBody>
-        </p:sp>
-        <p:sp>
-          <p:nvSpPr>
-            <p:cNvPr id="37" name="TextBox 36"/>
-            <p:cNvSpPr txBox="1"/>
-            <p:nvPr/>
-          </p:nvSpPr>
-          <p:spPr>
-            <a:xfrm>
-              <a:off x="1276350" y="4357385"/>
-              <a:ext cx="1385586" cy="600164"/>
-            </a:xfrm>
-            <a:prstGeom prst="rect">
-              <a:avLst/>
-            </a:prstGeom>
-            <a:noFill/>
-          </p:spPr>
-          <p:txBody>
-            <a:bodyPr wrap="square" rtlCol="0">
-              <a:spAutoFit/>
-            </a:bodyPr>
-            <a:lstStyle/>
-            <a:p>
-              <a:pPr algn="ctr"/>
-              <a:r>
-                <a:rPr lang="ru-RU" sz="1100" dirty="0">
-                  <a:latin typeface="Times New Roman" panose="02020603050405020304" pitchFamily="18" charset="0"/>
-                  <a:cs typeface="Times New Roman" panose="02020603050405020304" pitchFamily="18" charset="0"/>
-                </a:rPr>
-                <a:t>Кривые без экспериментальных данных</a:t>
-              </a:r>
-            </a:p>
-          </p:txBody>
-        </p:sp>
-        <p:cxnSp>
-          <p:nvCxnSpPr>
-            <p:cNvPr id="38" name="Прямая со стрелкой 37"/>
-            <p:cNvCxnSpPr/>
-            <p:nvPr/>
-          </p:nvCxnSpPr>
-          <p:spPr>
-            <a:xfrm>
-              <a:off x="2855492" y="1279956"/>
-              <a:ext cx="269081" cy="0"/>
-            </a:xfrm>
-            <a:prstGeom prst="straightConnector1">
-              <a:avLst/>
-            </a:prstGeom>
-            <a:ln w="47625">
-              <a:tailEnd type="stealth" w="lg" len="lg"/>
-            </a:ln>
-          </p:spPr>
-          <p:style>
-            <a:lnRef idx="1">
-              <a:schemeClr val="accent1"/>
-            </a:lnRef>
-            <a:fillRef idx="0">
-              <a:schemeClr val="accent1"/>
-            </a:fillRef>
-            <a:effectRef idx="0">
-              <a:schemeClr val="accent1"/>
-            </a:effectRef>
-            <a:fontRef idx="minor">
-              <a:schemeClr val="tx1"/>
-            </a:fontRef>
-          </p:style>
-        </p:cxnSp>
-        <p:sp>
-          <p:nvSpPr>
-            <p:cNvPr id="39" name="TextBox 38"/>
-            <p:cNvSpPr txBox="1"/>
-            <p:nvPr/>
-          </p:nvSpPr>
-          <p:spPr>
-            <a:xfrm>
-              <a:off x="1419225" y="1113976"/>
-              <a:ext cx="1426368" cy="430887"/>
-            </a:xfrm>
-            <a:prstGeom prst="rect">
-              <a:avLst/>
-            </a:prstGeom>
-            <a:noFill/>
-          </p:spPr>
-          <p:txBody>
-            <a:bodyPr wrap="square" rtlCol="0">
-              <a:spAutoFit/>
-            </a:bodyPr>
-            <a:lstStyle/>
-            <a:p>
-              <a:pPr algn="ctr"/>
-              <a:r>
-                <a:rPr lang="ru-RU" sz="1100" dirty="0">
-                  <a:latin typeface="Times New Roman" panose="02020603050405020304" pitchFamily="18" charset="0"/>
-                  <a:cs typeface="Times New Roman" panose="02020603050405020304" pitchFamily="18" charset="0"/>
-                </a:rPr>
-                <a:t>Вкладки со структурами</a:t>
-              </a:r>
-            </a:p>
-          </p:txBody>
-        </p:sp>
         <p:pic>
           <p:nvPicPr>
-            <p:cNvPr id="40" name="Рисунок 39"/>
+            <p:cNvPr id="5" name="Picture 4">
+              <a:extLst>
+                <a:ext uri="{FF2B5EF4-FFF2-40B4-BE49-F238E27FC236}">
+                  <a16:creationId xmlns:a16="http://schemas.microsoft.com/office/drawing/2014/main" id="{145E3F67-D1C4-C4FE-1E9F-62BC7A80C490}"/>
+                </a:ext>
+              </a:extLst>
+            </p:cNvPr>
             <p:cNvPicPr>
               <a:picLocks noChangeAspect="1"/>
             </p:cNvPicPr>
@@ -4150,8 +4174,8 @@
           </p:blipFill>
           <p:spPr>
             <a:xfrm>
-              <a:off x="3226148" y="597648"/>
-              <a:ext cx="3105150" cy="5857875"/>
+              <a:off x="7321794" y="578095"/>
+              <a:ext cx="2876550" cy="5848350"/>
             </a:xfrm>
             <a:prstGeom prst="rect">
               <a:avLst/>
@@ -20131,36 +20155,47 @@
       </p:grpSp>
       <p:grpSp>
         <p:nvGrpSpPr>
-          <p:cNvPr id="146" name="Группа 145"/>
+          <p:cNvPr id="19" name="Group 18">
+            <a:extLst>
+              <a:ext uri="{FF2B5EF4-FFF2-40B4-BE49-F238E27FC236}">
+                <a16:creationId xmlns:a16="http://schemas.microsoft.com/office/drawing/2014/main" id="{2DA80AAC-0E88-EBC3-6EED-17FFCB432350}"/>
+              </a:ext>
+            </a:extLst>
+          </p:cNvPr>
           <p:cNvGrpSpPr/>
           <p:nvPr/>
         </p:nvGrpSpPr>
         <p:grpSpPr>
           <a:xfrm>
-            <a:off x="2142083" y="1626236"/>
-            <a:ext cx="5149523" cy="1349615"/>
-            <a:chOff x="2046290" y="1991996"/>
-            <a:chExt cx="5149523" cy="1349615"/>
+            <a:off x="2142083" y="1638300"/>
+            <a:ext cx="4767657" cy="1337551"/>
+            <a:chOff x="2142083" y="1638300"/>
+            <a:chExt cx="4767657" cy="1337551"/>
           </a:xfrm>
         </p:grpSpPr>
         <p:pic>
           <p:nvPicPr>
-            <p:cNvPr id="8" name="Рисунок 7"/>
+            <p:cNvPr id="11" name="Picture 10">
+              <a:extLst>
+                <a:ext uri="{FF2B5EF4-FFF2-40B4-BE49-F238E27FC236}">
+                  <a16:creationId xmlns:a16="http://schemas.microsoft.com/office/drawing/2014/main" id="{C90448A0-F337-DAA0-F9D2-ECE341FF7FDD}"/>
+                </a:ext>
+              </a:extLst>
+            </p:cNvPr>
             <p:cNvPicPr>
               <a:picLocks noChangeAspect="1"/>
             </p:cNvPicPr>
             <p:nvPr/>
           </p:nvPicPr>
-          <p:blipFill>
+          <p:blipFill rotWithShape="1">
             <a:blip r:embed="rId3"/>
-            <a:stretch>
-              <a:fillRect/>
-            </a:stretch>
+            <a:srcRect l="3721" t="10000" r="5352" b="4073"/>
+            <a:stretch/>
           </p:blipFill>
           <p:spPr>
             <a:xfrm>
-              <a:off x="2751455" y="1991996"/>
-              <a:ext cx="3067050" cy="390525"/>
+              <a:off x="2844799" y="1638300"/>
+              <a:ext cx="2832101" cy="368300"/>
             </a:xfrm>
             <a:prstGeom prst="rect">
               <a:avLst/>
@@ -20175,7 +20210,7 @@
           </p:nvSpPr>
           <p:spPr>
             <a:xfrm>
-              <a:off x="2046290" y="2483502"/>
+              <a:off x="2142083" y="2117742"/>
               <a:ext cx="705166" cy="246221"/>
             </a:xfrm>
             <a:prstGeom prst="rect">
@@ -20212,7 +20247,7 @@
           </p:nvCxnSpPr>
           <p:spPr>
             <a:xfrm flipV="1">
-              <a:off x="2648109" y="2356482"/>
+              <a:off x="2743902" y="1990722"/>
               <a:ext cx="231460" cy="200278"/>
             </a:xfrm>
             <a:prstGeom prst="straightConnector1">
@@ -20248,7 +20283,7 @@
           </p:nvSpPr>
           <p:spPr>
             <a:xfrm>
-              <a:off x="2116456" y="2725496"/>
+              <a:off x="2212249" y="2359736"/>
               <a:ext cx="1035050" cy="246221"/>
             </a:xfrm>
             <a:prstGeom prst="rect">
@@ -20285,7 +20320,7 @@
           </p:nvSpPr>
           <p:spPr>
             <a:xfrm>
-              <a:off x="2434987" y="2941501"/>
+              <a:off x="2530780" y="2575741"/>
               <a:ext cx="1035050" cy="400110"/>
             </a:xfrm>
             <a:prstGeom prst="rect">
@@ -20322,7 +20357,7 @@
           </p:nvSpPr>
           <p:spPr>
             <a:xfrm>
-              <a:off x="3186112" y="2825657"/>
+              <a:off x="3281905" y="2459897"/>
               <a:ext cx="793750" cy="246221"/>
             </a:xfrm>
             <a:prstGeom prst="rect">
@@ -20359,7 +20394,7 @@
           </p:nvSpPr>
           <p:spPr>
             <a:xfrm>
-              <a:off x="3414712" y="3058208"/>
+              <a:off x="3510505" y="2692448"/>
               <a:ext cx="793750" cy="246221"/>
             </a:xfrm>
             <a:prstGeom prst="rect">
@@ -20396,7 +20431,7 @@
           </p:nvSpPr>
           <p:spPr>
             <a:xfrm>
-              <a:off x="3621009" y="2829856"/>
+              <a:off x="3716802" y="2464096"/>
               <a:ext cx="793750" cy="246221"/>
             </a:xfrm>
             <a:prstGeom prst="rect">
@@ -20433,7 +20468,7 @@
           </p:nvSpPr>
           <p:spPr>
             <a:xfrm>
-              <a:off x="3888264" y="3033638"/>
+              <a:off x="3984057" y="2667878"/>
               <a:ext cx="793750" cy="246221"/>
             </a:xfrm>
             <a:prstGeom prst="rect">
@@ -20470,7 +20505,7 @@
           </p:nvSpPr>
           <p:spPr>
             <a:xfrm>
-              <a:off x="4117974" y="2823915"/>
+              <a:off x="4213767" y="2458155"/>
               <a:ext cx="793750" cy="246221"/>
             </a:xfrm>
             <a:prstGeom prst="rect">
@@ -20507,7 +20542,7 @@
           </p:nvSpPr>
           <p:spPr>
             <a:xfrm>
-              <a:off x="4397611" y="3032264"/>
+              <a:off x="4493404" y="2666504"/>
               <a:ext cx="793750" cy="246221"/>
             </a:xfrm>
             <a:prstGeom prst="rect">
@@ -20544,7 +20579,7 @@
           </p:nvSpPr>
           <p:spPr>
             <a:xfrm>
-              <a:off x="4648037" y="2834758"/>
+              <a:off x="4743830" y="2468998"/>
               <a:ext cx="940435" cy="246221"/>
             </a:xfrm>
             <a:prstGeom prst="rect">
@@ -20581,7 +20616,7 @@
           </p:nvSpPr>
           <p:spPr>
             <a:xfrm>
-              <a:off x="5305424" y="3023134"/>
+              <a:off x="5452017" y="2574824"/>
               <a:ext cx="793750" cy="246221"/>
             </a:xfrm>
             <a:prstGeom prst="rect">
@@ -20618,7 +20653,7 @@
           </p:nvSpPr>
           <p:spPr>
             <a:xfrm>
-              <a:off x="5563632" y="2732575"/>
+              <a:off x="5646725" y="2233465"/>
               <a:ext cx="1263015" cy="246221"/>
             </a:xfrm>
             <a:prstGeom prst="rect">
@@ -20647,43 +20682,6 @@
             </a:p>
           </p:txBody>
         </p:sp>
-        <p:sp>
-          <p:nvSpPr>
-            <p:cNvPr id="34" name="TextBox 33"/>
-            <p:cNvSpPr txBox="1"/>
-            <p:nvPr/>
-          </p:nvSpPr>
-          <p:spPr>
-            <a:xfrm>
-              <a:off x="5681338" y="2526540"/>
-              <a:ext cx="1514475" cy="246221"/>
-            </a:xfrm>
-            <a:prstGeom prst="rect">
-              <a:avLst/>
-            </a:prstGeom>
-            <a:noFill/>
-          </p:spPr>
-          <p:txBody>
-            <a:bodyPr wrap="square" rtlCol="0">
-              <a:spAutoFit/>
-            </a:bodyPr>
-            <a:lstStyle/>
-            <a:p>
-              <a:pPr algn="ctr"/>
-              <a:r>
-                <a:rPr lang="en-US" sz="1000" dirty="0">
-                  <a:latin typeface="Times New Roman" panose="02020603050405020304" pitchFamily="18" charset="0"/>
-                  <a:cs typeface="Times New Roman" panose="02020603050405020304" pitchFamily="18" charset="0"/>
-                </a:rPr>
-                <a:t>Save structure as text</a:t>
-              </a:r>
-              <a:endParaRPr lang="ru-RU" sz="1000" dirty="0">
-                <a:latin typeface="Times New Roman" panose="02020603050405020304" pitchFamily="18" charset="0"/>
-                <a:cs typeface="Times New Roman" panose="02020603050405020304" pitchFamily="18" charset="0"/>
-              </a:endParaRPr>
-            </a:p>
-          </p:txBody>
-        </p:sp>
         <p:cxnSp>
           <p:nvCxnSpPr>
             <p:cNvPr id="65" name="Прямая со стрелкой 64"/>
@@ -20692,7 +20690,7 @@
           </p:nvCxnSpPr>
           <p:spPr>
             <a:xfrm flipV="1">
-              <a:off x="2943702" y="2355474"/>
+              <a:off x="3039495" y="1989714"/>
               <a:ext cx="167797" cy="418851"/>
             </a:xfrm>
             <a:prstGeom prst="straightConnector1">
@@ -20728,7 +20726,7 @@
           </p:nvCxnSpPr>
           <p:spPr>
             <a:xfrm flipV="1">
-              <a:off x="3186112" y="2351249"/>
+              <a:off x="3281905" y="1985489"/>
               <a:ext cx="198357" cy="580298"/>
             </a:xfrm>
             <a:prstGeom prst="straightConnector1">
@@ -20764,7 +20762,7 @@
           </p:nvCxnSpPr>
           <p:spPr>
             <a:xfrm flipV="1">
-              <a:off x="3589255" y="2351930"/>
+              <a:off x="3685048" y="1986170"/>
               <a:ext cx="0" cy="504000"/>
             </a:xfrm>
             <a:prstGeom prst="straightConnector1">
@@ -20800,7 +20798,7 @@
           </p:nvCxnSpPr>
           <p:spPr>
             <a:xfrm flipV="1">
-              <a:off x="4028996" y="2349142"/>
+              <a:off x="4124789" y="1983382"/>
               <a:ext cx="0" cy="504000"/>
             </a:xfrm>
             <a:prstGeom prst="straightConnector1">
@@ -20836,7 +20834,7 @@
           </p:nvCxnSpPr>
           <p:spPr>
             <a:xfrm flipV="1">
-              <a:off x="4508419" y="2330758"/>
+              <a:off x="4604212" y="1964998"/>
               <a:ext cx="0" cy="504000"/>
             </a:xfrm>
             <a:prstGeom prst="straightConnector1">
@@ -20867,13 +20865,15 @@
         <p:cxnSp>
           <p:nvCxnSpPr>
             <p:cNvPr id="85" name="Прямая со стрелкой 84"/>
-            <p:cNvCxnSpPr/>
+            <p:cNvCxnSpPr>
+              <a:cxnSpLocks/>
+            </p:cNvCxnSpPr>
             <p:nvPr/>
           </p:nvCxnSpPr>
           <p:spPr>
-            <a:xfrm flipV="1">
-              <a:off x="4932362" y="2353256"/>
-              <a:ext cx="0" cy="504000"/>
+            <a:xfrm flipH="1" flipV="1">
+              <a:off x="5021805" y="1987496"/>
+              <a:ext cx="185893" cy="481502"/>
             </a:xfrm>
             <a:prstGeom prst="straightConnector1">
               <a:avLst/>
@@ -20903,49 +20903,15 @@
         <p:cxnSp>
           <p:nvCxnSpPr>
             <p:cNvPr id="86" name="Прямая со стрелкой 85"/>
-            <p:cNvCxnSpPr/>
+            <p:cNvCxnSpPr>
+              <a:cxnSpLocks/>
+            </p:cNvCxnSpPr>
             <p:nvPr/>
           </p:nvCxnSpPr>
           <p:spPr>
             <a:xfrm flipH="1" flipV="1">
-              <a:off x="5157944" y="2347168"/>
-              <a:ext cx="425055" cy="704558"/>
-            </a:xfrm>
-            <a:prstGeom prst="straightConnector1">
-              <a:avLst/>
-            </a:prstGeom>
-            <a:ln w="6350">
-              <a:solidFill>
-                <a:schemeClr val="tx1"/>
-              </a:solidFill>
-              <a:tailEnd type="stealth" w="med" len="med"/>
-            </a:ln>
-          </p:spPr>
-          <p:style>
-            <a:lnRef idx="1">
-              <a:schemeClr val="accent1"/>
-            </a:lnRef>
-            <a:fillRef idx="0">
-              <a:schemeClr val="accent1"/>
-            </a:fillRef>
-            <a:effectRef idx="0">
-              <a:schemeClr val="accent1"/>
-            </a:effectRef>
-            <a:fontRef idx="minor">
-              <a:schemeClr val="tx1"/>
-            </a:fontRef>
-          </p:style>
-        </p:cxnSp>
-        <p:cxnSp>
-          <p:nvCxnSpPr>
-            <p:cNvPr id="87" name="Прямая со стрелкой 86"/>
-            <p:cNvCxnSpPr/>
-            <p:nvPr/>
-          </p:nvCxnSpPr>
-          <p:spPr>
-            <a:xfrm flipH="1" flipV="1">
-              <a:off x="5612287" y="2351249"/>
-              <a:ext cx="312263" cy="213650"/>
+              <a:off x="5295900" y="1993900"/>
+              <a:ext cx="546642" cy="580924"/>
             </a:xfrm>
             <a:prstGeom prst="straightConnector1">
               <a:avLst/>
@@ -20975,13 +20941,15 @@
         <p:cxnSp>
           <p:nvCxnSpPr>
             <p:cNvPr id="89" name="Прямая со стрелкой 88"/>
-            <p:cNvCxnSpPr/>
+            <p:cNvCxnSpPr>
+              <a:cxnSpLocks/>
+            </p:cNvCxnSpPr>
             <p:nvPr/>
           </p:nvCxnSpPr>
           <p:spPr>
             <a:xfrm flipH="1" flipV="1">
-              <a:off x="5370664" y="2349142"/>
-              <a:ext cx="377674" cy="429946"/>
+              <a:off x="5472807" y="1964332"/>
+              <a:ext cx="369193" cy="296268"/>
             </a:xfrm>
             <a:prstGeom prst="straightConnector1">
               <a:avLst/>
@@ -21016,7 +20984,7 @@
           </p:nvCxnSpPr>
           <p:spPr>
             <a:xfrm flipV="1">
-              <a:off x="4727574" y="2360733"/>
+              <a:off x="4823367" y="1994973"/>
               <a:ext cx="0" cy="720000"/>
             </a:xfrm>
             <a:prstGeom prst="straightConnector1">
@@ -21052,7 +21020,7 @@
           </p:nvCxnSpPr>
           <p:spPr>
             <a:xfrm flipV="1">
-              <a:off x="4275136" y="2337506"/>
+              <a:off x="4370929" y="1971746"/>
               <a:ext cx="0" cy="720000"/>
             </a:xfrm>
             <a:prstGeom prst="straightConnector1">
@@ -21088,7 +21056,7 @@
           </p:nvCxnSpPr>
           <p:spPr>
             <a:xfrm flipV="1">
-              <a:off x="3808411" y="2353726"/>
+              <a:off x="3904204" y="1987966"/>
               <a:ext cx="0" cy="720000"/>
             </a:xfrm>
             <a:prstGeom prst="straightConnector1">
@@ -21119,18 +21087,53 @@
       </p:grpSp>
       <p:grpSp>
         <p:nvGrpSpPr>
-          <p:cNvPr id="147" name="Группа 146"/>
+          <p:cNvPr id="18" name="Group 17">
+            <a:extLst>
+              <a:ext uri="{FF2B5EF4-FFF2-40B4-BE49-F238E27FC236}">
+                <a16:creationId xmlns:a16="http://schemas.microsoft.com/office/drawing/2014/main" id="{D702F73C-650A-3420-6D2E-0CEDBA713019}"/>
+              </a:ext>
+            </a:extLst>
+          </p:cNvPr>
           <p:cNvGrpSpPr/>
           <p:nvPr/>
         </p:nvGrpSpPr>
         <p:grpSpPr>
           <a:xfrm>
-            <a:off x="1565120" y="3176430"/>
-            <a:ext cx="6235038" cy="1615691"/>
-            <a:chOff x="1556412" y="3837703"/>
-            <a:chExt cx="6235038" cy="1615691"/>
+            <a:off x="1565120" y="3187700"/>
+            <a:ext cx="5244601" cy="1604421"/>
+            <a:chOff x="1565120" y="3187700"/>
+            <a:chExt cx="5244601" cy="1604421"/>
           </a:xfrm>
         </p:grpSpPr>
+        <p:pic>
+          <p:nvPicPr>
+            <p:cNvPr id="10" name="Picture 9">
+              <a:extLst>
+                <a:ext uri="{FF2B5EF4-FFF2-40B4-BE49-F238E27FC236}">
+                  <a16:creationId xmlns:a16="http://schemas.microsoft.com/office/drawing/2014/main" id="{DC15D505-6551-1C06-9C12-BD6860327E45}"/>
+                </a:ext>
+              </a:extLst>
+            </p:cNvPr>
+            <p:cNvPicPr>
+              <a:picLocks noChangeAspect="1"/>
+            </p:cNvPicPr>
+            <p:nvPr/>
+          </p:nvPicPr>
+          <p:blipFill rotWithShape="1">
+            <a:blip r:embed="rId3"/>
+            <a:srcRect l="3721" t="10000" r="5352" b="4073"/>
+            <a:stretch/>
+          </p:blipFill>
+          <p:spPr>
+            <a:xfrm>
+              <a:off x="2787649" y="3187700"/>
+              <a:ext cx="2832101" cy="368300"/>
+            </a:xfrm>
+            <a:prstGeom prst="rect">
+              <a:avLst/>
+            </a:prstGeom>
+          </p:spPr>
+        </p:pic>
         <p:sp>
           <p:nvSpPr>
             <p:cNvPr id="37" name="TextBox 36"/>
@@ -21139,7 +21142,7 @@
           </p:nvSpPr>
           <p:spPr>
             <a:xfrm>
-              <a:off x="1594454" y="4368931"/>
+              <a:off x="1603162" y="3707658"/>
               <a:ext cx="1441450" cy="246221"/>
             </a:xfrm>
             <a:prstGeom prst="rect">
@@ -21186,7 +21189,7 @@
           </p:nvSpPr>
           <p:spPr>
             <a:xfrm>
-              <a:off x="1602741" y="4560136"/>
+              <a:off x="1611449" y="3898863"/>
               <a:ext cx="1568450" cy="246221"/>
             </a:xfrm>
             <a:prstGeom prst="rect">
@@ -21219,7 +21222,7 @@
           </p:nvSpPr>
           <p:spPr>
             <a:xfrm>
-              <a:off x="1556412" y="4858695"/>
+              <a:off x="1565120" y="4197422"/>
               <a:ext cx="1504243" cy="246221"/>
             </a:xfrm>
             <a:prstGeom prst="rect">
@@ -21252,7 +21255,7 @@
           </p:nvSpPr>
           <p:spPr>
             <a:xfrm>
-              <a:off x="2892491" y="4732461"/>
+              <a:off x="2901199" y="4071188"/>
               <a:ext cx="1000070" cy="246221"/>
             </a:xfrm>
             <a:prstGeom prst="rect">
@@ -21285,7 +21288,7 @@
           </p:nvSpPr>
           <p:spPr>
             <a:xfrm>
-              <a:off x="3411706" y="4969844"/>
+              <a:off x="3420414" y="4308571"/>
               <a:ext cx="793750" cy="246221"/>
             </a:xfrm>
             <a:prstGeom prst="rect">
@@ -21318,7 +21321,7 @@
           </p:nvSpPr>
           <p:spPr>
             <a:xfrm>
-              <a:off x="3705145" y="4701294"/>
+              <a:off x="3713853" y="4040021"/>
               <a:ext cx="793750" cy="246221"/>
             </a:xfrm>
             <a:prstGeom prst="rect">
@@ -21351,7 +21354,7 @@
           </p:nvSpPr>
           <p:spPr>
             <a:xfrm>
-              <a:off x="3960380" y="4976154"/>
+              <a:off x="3969088" y="4314881"/>
               <a:ext cx="971550" cy="246221"/>
             </a:xfrm>
             <a:prstGeom prst="rect">
@@ -21384,7 +21387,7 @@
           </p:nvSpPr>
           <p:spPr>
             <a:xfrm>
-              <a:off x="4236244" y="4597848"/>
+              <a:off x="4244952" y="3936575"/>
               <a:ext cx="793750" cy="246221"/>
             </a:xfrm>
             <a:prstGeom prst="rect">
@@ -21417,7 +21420,7 @@
           </p:nvSpPr>
           <p:spPr>
             <a:xfrm>
-              <a:off x="4498895" y="5207173"/>
+              <a:off x="4507603" y="4545900"/>
               <a:ext cx="1290158" cy="246221"/>
             </a:xfrm>
             <a:prstGeom prst="rect">
@@ -21464,7 +21467,7 @@
           </p:nvSpPr>
           <p:spPr>
             <a:xfrm>
-              <a:off x="4844494" y="4699195"/>
+              <a:off x="4853202" y="4037922"/>
               <a:ext cx="922894" cy="400110"/>
             </a:xfrm>
             <a:prstGeom prst="rect">
@@ -21511,7 +21514,7 @@
           </p:nvSpPr>
           <p:spPr>
             <a:xfrm>
-              <a:off x="5546436" y="4899250"/>
+              <a:off x="5567844" y="4180827"/>
               <a:ext cx="1216313" cy="246221"/>
             </a:xfrm>
             <a:prstGeom prst="rect">
@@ -21544,7 +21547,7 @@
           </p:nvSpPr>
           <p:spPr>
             <a:xfrm>
-              <a:off x="5649671" y="4592979"/>
+              <a:off x="5677429" y="3861856"/>
               <a:ext cx="1132292" cy="246221"/>
             </a:xfrm>
             <a:prstGeom prst="rect">
@@ -21569,63 +21572,6 @@
             </a:p>
           </p:txBody>
         </p:sp>
-        <p:sp>
-          <p:nvSpPr>
-            <p:cNvPr id="50" name="TextBox 49"/>
-            <p:cNvSpPr txBox="1"/>
-            <p:nvPr/>
-          </p:nvSpPr>
-          <p:spPr>
-            <a:xfrm>
-              <a:off x="5863472" y="4347381"/>
-              <a:ext cx="1927978" cy="246221"/>
-            </a:xfrm>
-            <a:prstGeom prst="rect">
-              <a:avLst/>
-            </a:prstGeom>
-            <a:noFill/>
-          </p:spPr>
-          <p:txBody>
-            <a:bodyPr wrap="square" rtlCol="0">
-              <a:spAutoFit/>
-            </a:bodyPr>
-            <a:lstStyle/>
-            <a:p>
-              <a:pPr algn="ctr"/>
-              <a:r>
-                <a:rPr lang="ru-RU" sz="1000" dirty="0">
-                  <a:latin typeface="Times New Roman" panose="02020603050405020304" pitchFamily="18" charset="0"/>
-                  <a:cs typeface="Times New Roman" panose="02020603050405020304" pitchFamily="18" charset="0"/>
-                </a:rPr>
-                <a:t>Сохранить структуру как текст</a:t>
-              </a:r>
-            </a:p>
-          </p:txBody>
-        </p:sp>
-        <p:pic>
-          <p:nvPicPr>
-            <p:cNvPr id="101" name="Рисунок 100"/>
-            <p:cNvPicPr>
-              <a:picLocks noChangeAspect="1"/>
-            </p:cNvPicPr>
-            <p:nvPr/>
-          </p:nvPicPr>
-          <p:blipFill>
-            <a:blip r:embed="rId3"/>
-            <a:stretch>
-              <a:fillRect/>
-            </a:stretch>
-          </p:blipFill>
-          <p:spPr>
-            <a:xfrm>
-              <a:off x="2780031" y="3837703"/>
-              <a:ext cx="3067050" cy="390525"/>
-            </a:xfrm>
-            <a:prstGeom prst="rect">
-              <a:avLst/>
-            </a:prstGeom>
-          </p:spPr>
-        </p:pic>
         <p:cxnSp>
           <p:nvCxnSpPr>
             <p:cNvPr id="103" name="Прямая со стрелкой 102"/>
@@ -21634,7 +21580,7 @@
           </p:nvCxnSpPr>
           <p:spPr>
             <a:xfrm flipV="1">
-              <a:off x="2676685" y="4202189"/>
+              <a:off x="2685393" y="3540916"/>
               <a:ext cx="231460" cy="200278"/>
             </a:xfrm>
             <a:prstGeom prst="straightConnector1">
@@ -21670,7 +21616,7 @@
           </p:nvCxnSpPr>
           <p:spPr>
             <a:xfrm flipV="1">
-              <a:off x="2918819" y="4201182"/>
+              <a:off x="2927527" y="3539909"/>
               <a:ext cx="221256" cy="391797"/>
             </a:xfrm>
             <a:prstGeom prst="straightConnector1">
@@ -21706,7 +21652,7 @@
           </p:nvCxnSpPr>
           <p:spPr>
             <a:xfrm flipV="1">
-              <a:off x="2908145" y="4206440"/>
+              <a:off x="2916853" y="3545167"/>
               <a:ext cx="497993" cy="707606"/>
             </a:xfrm>
             <a:prstGeom prst="straightConnector1">
@@ -21742,7 +21688,7 @@
           </p:nvCxnSpPr>
           <p:spPr>
             <a:xfrm flipV="1">
-              <a:off x="3386176" y="4210823"/>
+              <a:off x="3394884" y="3549550"/>
               <a:ext cx="226104" cy="521638"/>
             </a:xfrm>
             <a:prstGeom prst="straightConnector1">
@@ -21778,7 +21724,7 @@
           </p:nvCxnSpPr>
           <p:spPr>
             <a:xfrm flipH="1" flipV="1">
-              <a:off x="4073524" y="4196048"/>
+              <a:off x="4082232" y="3534775"/>
               <a:ext cx="22146" cy="511596"/>
             </a:xfrm>
             <a:prstGeom prst="straightConnector1">
@@ -21814,7 +21760,7 @@
           </p:nvCxnSpPr>
           <p:spPr>
             <a:xfrm flipH="1" flipV="1">
-              <a:off x="4524295" y="4189165"/>
+              <a:off x="4533003" y="3527892"/>
               <a:ext cx="83424" cy="434083"/>
             </a:xfrm>
             <a:prstGeom prst="straightConnector1">
@@ -21850,7 +21796,7 @@
           </p:nvCxnSpPr>
           <p:spPr>
             <a:xfrm flipH="1" flipV="1">
-              <a:off x="4999038" y="4186264"/>
+              <a:off x="5007746" y="3524991"/>
               <a:ext cx="160597" cy="556134"/>
             </a:xfrm>
             <a:prstGeom prst="straightConnector1">
@@ -21881,49 +21827,15 @@
         <p:cxnSp>
           <p:nvCxnSpPr>
             <p:cNvPr id="122" name="Прямая со стрелкой 121"/>
-            <p:cNvCxnSpPr/>
+            <p:cNvCxnSpPr>
+              <a:cxnSpLocks/>
+            </p:cNvCxnSpPr>
             <p:nvPr/>
           </p:nvCxnSpPr>
           <p:spPr>
             <a:xfrm flipH="1" flipV="1">
-              <a:off x="5204138" y="4204421"/>
-              <a:ext cx="614367" cy="743094"/>
-            </a:xfrm>
-            <a:prstGeom prst="straightConnector1">
-              <a:avLst/>
-            </a:prstGeom>
-            <a:ln w="6350">
-              <a:solidFill>
-                <a:schemeClr val="tx1"/>
-              </a:solidFill>
-              <a:tailEnd type="stealth" w="med" len="med"/>
-            </a:ln>
-          </p:spPr>
-          <p:style>
-            <a:lnRef idx="1">
-              <a:schemeClr val="accent1"/>
-            </a:lnRef>
-            <a:fillRef idx="0">
-              <a:schemeClr val="accent1"/>
-            </a:fillRef>
-            <a:effectRef idx="0">
-              <a:schemeClr val="accent1"/>
-            </a:effectRef>
-            <a:fontRef idx="minor">
-              <a:schemeClr val="tx1"/>
-            </a:fontRef>
-          </p:style>
-        </p:cxnSp>
-        <p:cxnSp>
-          <p:nvCxnSpPr>
-            <p:cNvPr id="123" name="Прямая со стрелкой 122"/>
-            <p:cNvCxnSpPr/>
-            <p:nvPr/>
-          </p:nvCxnSpPr>
-          <p:spPr>
-            <a:xfrm flipH="1" flipV="1">
-              <a:off x="5640863" y="4196956"/>
-              <a:ext cx="312263" cy="213650"/>
+              <a:off x="5212846" y="3543148"/>
+              <a:ext cx="610104" cy="647852"/>
             </a:xfrm>
             <a:prstGeom prst="straightConnector1">
               <a:avLst/>
@@ -21953,13 +21865,15 @@
         <p:cxnSp>
           <p:nvCxnSpPr>
             <p:cNvPr id="124" name="Прямая со стрелкой 123"/>
-            <p:cNvCxnSpPr/>
+            <p:cNvCxnSpPr>
+              <a:cxnSpLocks/>
+            </p:cNvCxnSpPr>
             <p:nvPr/>
           </p:nvCxnSpPr>
           <p:spPr>
             <a:xfrm flipH="1" flipV="1">
-              <a:off x="5399240" y="4194849"/>
-              <a:ext cx="377674" cy="429946"/>
+              <a:off x="5426998" y="3527226"/>
+              <a:ext cx="465802" cy="333574"/>
             </a:xfrm>
             <a:prstGeom prst="straightConnector1">
               <a:avLst/>
@@ -21994,7 +21908,7 @@
           </p:nvCxnSpPr>
           <p:spPr>
             <a:xfrm flipH="1" flipV="1">
-              <a:off x="4794562" y="4186264"/>
+              <a:off x="4803270" y="3524991"/>
               <a:ext cx="208852" cy="1042421"/>
             </a:xfrm>
             <a:prstGeom prst="straightConnector1">
@@ -22030,7 +21944,7 @@
           </p:nvCxnSpPr>
           <p:spPr>
             <a:xfrm flipH="1" flipV="1">
-              <a:off x="4280375" y="4188029"/>
+              <a:off x="4289083" y="3526756"/>
               <a:ext cx="140380" cy="788125"/>
             </a:xfrm>
             <a:prstGeom prst="straightConnector1">
@@ -22066,7 +21980,7 @@
           </p:nvCxnSpPr>
           <p:spPr>
             <a:xfrm flipV="1">
-              <a:off x="3814931" y="4212836"/>
+              <a:off x="3823639" y="3551563"/>
               <a:ext cx="41583" cy="769708"/>
             </a:xfrm>
             <a:prstGeom prst="straightConnector1">

</xml_diff>